<commit_message>
update final final ppt
</commit_message>
<xml_diff>
--- a/docs/final_final_pre.pptx
+++ b/docs/final_final_pre.pptx
@@ -10,8 +10,13 @@
     <p:sldId id="263" r:id="rId4"/>
     <p:sldId id="260" r:id="rId5"/>
     <p:sldId id="261" r:id="rId6"/>
-    <p:sldId id="262" r:id="rId7"/>
-    <p:sldId id="259" r:id="rId8"/>
+    <p:sldId id="264" r:id="rId7"/>
+    <p:sldId id="266" r:id="rId8"/>
+    <p:sldId id="267" r:id="rId9"/>
+    <p:sldId id="262" r:id="rId10"/>
+    <p:sldId id="259" r:id="rId11"/>
+    <p:sldId id="270" r:id="rId12"/>
+    <p:sldId id="269" r:id="rId13"/>
   </p:sldIdLst>
   <p:sldSz cx="12192000" cy="6858000"/>
   <p:notesSz cx="6858000" cy="9144000"/>
@@ -110,6 +115,11 @@
       </a:defRPr>
     </a:lvl9pPr>
   </p:defaultTextStyle>
+  <p:extLst>
+    <p:ext uri="{EFAFB233-063F-42B5-8137-9DF3F51BA10A}">
+      <p15:sldGuideLst xmlns:p15="http://schemas.microsoft.com/office/powerpoint/2012/main"/>
+    </p:ext>
+  </p:extLst>
 </p:presentation>
 </file>
 
@@ -135,7 +145,7 @@
           <p:cNvPr id="2" name="标题 1">
             <a:extLst>
               <a:ext uri="{FF2B5EF4-FFF2-40B4-BE49-F238E27FC236}">
-                <a16:creationId xmlns:a16="http://schemas.microsoft.com/office/drawing/2014/main" id="{96E92E86-104D-46C6-859D-FB3394322389}"/>
+                <a16:creationId xmlns:a16="http://schemas.microsoft.com/office/drawing/2014/main" xmlns="" id="{96E92E86-104D-46C6-859D-FB3394322389}"/>
               </a:ext>
             </a:extLst>
           </p:cNvPr>
@@ -172,7 +182,7 @@
           <p:cNvPr id="3" name="副标题 2">
             <a:extLst>
               <a:ext uri="{FF2B5EF4-FFF2-40B4-BE49-F238E27FC236}">
-                <a16:creationId xmlns:a16="http://schemas.microsoft.com/office/drawing/2014/main" id="{AE1579E5-F670-4DAC-9AED-5879A7DC7CC0}"/>
+                <a16:creationId xmlns:a16="http://schemas.microsoft.com/office/drawing/2014/main" xmlns="" id="{AE1579E5-F670-4DAC-9AED-5879A7DC7CC0}"/>
               </a:ext>
             </a:extLst>
           </p:cNvPr>
@@ -242,7 +252,7 @@
           <p:cNvPr id="4" name="日期占位符 3">
             <a:extLst>
               <a:ext uri="{FF2B5EF4-FFF2-40B4-BE49-F238E27FC236}">
-                <a16:creationId xmlns:a16="http://schemas.microsoft.com/office/drawing/2014/main" id="{F8E6F76A-37AC-4DA4-BA29-A802057C52CA}"/>
+                <a16:creationId xmlns:a16="http://schemas.microsoft.com/office/drawing/2014/main" xmlns="" id="{F8E6F76A-37AC-4DA4-BA29-A802057C52CA}"/>
               </a:ext>
             </a:extLst>
           </p:cNvPr>
@@ -260,7 +270,7 @@
           <a:p>
             <a:fld id="{219F432F-6DB3-43F6-A09E-69DBE75B6CC2}" type="datetimeFigureOut">
               <a:rPr lang="zh-CN" altLang="en-US" smtClean="0"/>
-              <a:t>2018-06-15</a:t>
+              <a:t>2018/6/15</a:t>
             </a:fld>
             <a:endParaRPr lang="zh-CN" altLang="en-US"/>
           </a:p>
@@ -271,7 +281,7 @@
           <p:cNvPr id="5" name="页脚占位符 4">
             <a:extLst>
               <a:ext uri="{FF2B5EF4-FFF2-40B4-BE49-F238E27FC236}">
-                <a16:creationId xmlns:a16="http://schemas.microsoft.com/office/drawing/2014/main" id="{6BEB23E5-E99C-4845-8D69-3E9626A937E4}"/>
+                <a16:creationId xmlns:a16="http://schemas.microsoft.com/office/drawing/2014/main" xmlns="" id="{6BEB23E5-E99C-4845-8D69-3E9626A937E4}"/>
               </a:ext>
             </a:extLst>
           </p:cNvPr>
@@ -296,7 +306,7 @@
           <p:cNvPr id="6" name="灯片编号占位符 5">
             <a:extLst>
               <a:ext uri="{FF2B5EF4-FFF2-40B4-BE49-F238E27FC236}">
-                <a16:creationId xmlns:a16="http://schemas.microsoft.com/office/drawing/2014/main" id="{5C7AF2C1-73DE-4470-BCDB-5D53C7E894BB}"/>
+                <a16:creationId xmlns:a16="http://schemas.microsoft.com/office/drawing/2014/main" xmlns="" id="{5C7AF2C1-73DE-4470-BCDB-5D53C7E894BB}"/>
               </a:ext>
             </a:extLst>
           </p:cNvPr>
@@ -355,7 +365,7 @@
           <p:cNvPr id="2" name="标题 1">
             <a:extLst>
               <a:ext uri="{FF2B5EF4-FFF2-40B4-BE49-F238E27FC236}">
-                <a16:creationId xmlns:a16="http://schemas.microsoft.com/office/drawing/2014/main" id="{65BC292D-6004-4227-BF0D-E71F302F2A55}"/>
+                <a16:creationId xmlns:a16="http://schemas.microsoft.com/office/drawing/2014/main" xmlns="" id="{65BC292D-6004-4227-BF0D-E71F302F2A55}"/>
               </a:ext>
             </a:extLst>
           </p:cNvPr>
@@ -383,7 +393,7 @@
           <p:cNvPr id="3" name="竖排文字占位符 2">
             <a:extLst>
               <a:ext uri="{FF2B5EF4-FFF2-40B4-BE49-F238E27FC236}">
-                <a16:creationId xmlns:a16="http://schemas.microsoft.com/office/drawing/2014/main" id="{C7636843-1FC0-4048-B195-DDFF6357378D}"/>
+                <a16:creationId xmlns:a16="http://schemas.microsoft.com/office/drawing/2014/main" xmlns="" id="{C7636843-1FC0-4048-B195-DDFF6357378D}"/>
               </a:ext>
             </a:extLst>
           </p:cNvPr>
@@ -440,7 +450,7 @@
           <p:cNvPr id="4" name="日期占位符 3">
             <a:extLst>
               <a:ext uri="{FF2B5EF4-FFF2-40B4-BE49-F238E27FC236}">
-                <a16:creationId xmlns:a16="http://schemas.microsoft.com/office/drawing/2014/main" id="{4F5442CE-24E9-42E1-8016-6D3BC5B95A6B}"/>
+                <a16:creationId xmlns:a16="http://schemas.microsoft.com/office/drawing/2014/main" xmlns="" id="{4F5442CE-24E9-42E1-8016-6D3BC5B95A6B}"/>
               </a:ext>
             </a:extLst>
           </p:cNvPr>
@@ -458,7 +468,7 @@
           <a:p>
             <a:fld id="{219F432F-6DB3-43F6-A09E-69DBE75B6CC2}" type="datetimeFigureOut">
               <a:rPr lang="zh-CN" altLang="en-US" smtClean="0"/>
-              <a:t>2018-06-15</a:t>
+              <a:t>2018/6/15</a:t>
             </a:fld>
             <a:endParaRPr lang="zh-CN" altLang="en-US"/>
           </a:p>
@@ -469,7 +479,7 @@
           <p:cNvPr id="5" name="页脚占位符 4">
             <a:extLst>
               <a:ext uri="{FF2B5EF4-FFF2-40B4-BE49-F238E27FC236}">
-                <a16:creationId xmlns:a16="http://schemas.microsoft.com/office/drawing/2014/main" id="{0487B350-6902-41A1-AEBA-CB542E8CCA4F}"/>
+                <a16:creationId xmlns:a16="http://schemas.microsoft.com/office/drawing/2014/main" xmlns="" id="{0487B350-6902-41A1-AEBA-CB542E8CCA4F}"/>
               </a:ext>
             </a:extLst>
           </p:cNvPr>
@@ -494,7 +504,7 @@
           <p:cNvPr id="6" name="灯片编号占位符 5">
             <a:extLst>
               <a:ext uri="{FF2B5EF4-FFF2-40B4-BE49-F238E27FC236}">
-                <a16:creationId xmlns:a16="http://schemas.microsoft.com/office/drawing/2014/main" id="{52934EEB-E3FA-4E18-BAF4-223B14D65D8C}"/>
+                <a16:creationId xmlns:a16="http://schemas.microsoft.com/office/drawing/2014/main" xmlns="" id="{52934EEB-E3FA-4E18-BAF4-223B14D65D8C}"/>
               </a:ext>
             </a:extLst>
           </p:cNvPr>
@@ -553,7 +563,7 @@
           <p:cNvPr id="2" name="竖排标题 1">
             <a:extLst>
               <a:ext uri="{FF2B5EF4-FFF2-40B4-BE49-F238E27FC236}">
-                <a16:creationId xmlns:a16="http://schemas.microsoft.com/office/drawing/2014/main" id="{9CFA9875-015D-4394-A31E-C1C1207FD51B}"/>
+                <a16:creationId xmlns:a16="http://schemas.microsoft.com/office/drawing/2014/main" xmlns="" id="{9CFA9875-015D-4394-A31E-C1C1207FD51B}"/>
               </a:ext>
             </a:extLst>
           </p:cNvPr>
@@ -586,7 +596,7 @@
           <p:cNvPr id="3" name="竖排文字占位符 2">
             <a:extLst>
               <a:ext uri="{FF2B5EF4-FFF2-40B4-BE49-F238E27FC236}">
-                <a16:creationId xmlns:a16="http://schemas.microsoft.com/office/drawing/2014/main" id="{A267091E-DD92-405E-9BBD-E5E6CD3DDDFA}"/>
+                <a16:creationId xmlns:a16="http://schemas.microsoft.com/office/drawing/2014/main" xmlns="" id="{A267091E-DD92-405E-9BBD-E5E6CD3DDDFA}"/>
               </a:ext>
             </a:extLst>
           </p:cNvPr>
@@ -648,7 +658,7 @@
           <p:cNvPr id="4" name="日期占位符 3">
             <a:extLst>
               <a:ext uri="{FF2B5EF4-FFF2-40B4-BE49-F238E27FC236}">
-                <a16:creationId xmlns:a16="http://schemas.microsoft.com/office/drawing/2014/main" id="{EABA5DE5-5A5F-4E4D-8B7C-6D5F2312759D}"/>
+                <a16:creationId xmlns:a16="http://schemas.microsoft.com/office/drawing/2014/main" xmlns="" id="{EABA5DE5-5A5F-4E4D-8B7C-6D5F2312759D}"/>
               </a:ext>
             </a:extLst>
           </p:cNvPr>
@@ -666,7 +676,7 @@
           <a:p>
             <a:fld id="{219F432F-6DB3-43F6-A09E-69DBE75B6CC2}" type="datetimeFigureOut">
               <a:rPr lang="zh-CN" altLang="en-US" smtClean="0"/>
-              <a:t>2018-06-15</a:t>
+              <a:t>2018/6/15</a:t>
             </a:fld>
             <a:endParaRPr lang="zh-CN" altLang="en-US"/>
           </a:p>
@@ -677,7 +687,7 @@
           <p:cNvPr id="5" name="页脚占位符 4">
             <a:extLst>
               <a:ext uri="{FF2B5EF4-FFF2-40B4-BE49-F238E27FC236}">
-                <a16:creationId xmlns:a16="http://schemas.microsoft.com/office/drawing/2014/main" id="{952955A0-F040-4C73-833F-41AD5E0FF490}"/>
+                <a16:creationId xmlns:a16="http://schemas.microsoft.com/office/drawing/2014/main" xmlns="" id="{952955A0-F040-4C73-833F-41AD5E0FF490}"/>
               </a:ext>
             </a:extLst>
           </p:cNvPr>
@@ -702,7 +712,7 @@
           <p:cNvPr id="6" name="灯片编号占位符 5">
             <a:extLst>
               <a:ext uri="{FF2B5EF4-FFF2-40B4-BE49-F238E27FC236}">
-                <a16:creationId xmlns:a16="http://schemas.microsoft.com/office/drawing/2014/main" id="{C5012027-22F3-41A3-9903-59768B58D8DC}"/>
+                <a16:creationId xmlns:a16="http://schemas.microsoft.com/office/drawing/2014/main" xmlns="" id="{C5012027-22F3-41A3-9903-59768B58D8DC}"/>
               </a:ext>
             </a:extLst>
           </p:cNvPr>
@@ -892,7 +902,7 @@
           <p:cNvPr id="2" name="标题 1">
             <a:extLst>
               <a:ext uri="{FF2B5EF4-FFF2-40B4-BE49-F238E27FC236}">
-                <a16:creationId xmlns:a16="http://schemas.microsoft.com/office/drawing/2014/main" id="{69E06B8B-E763-4992-9F69-2B3AD7D3C12F}"/>
+                <a16:creationId xmlns:a16="http://schemas.microsoft.com/office/drawing/2014/main" xmlns="" id="{69E06B8B-E763-4992-9F69-2B3AD7D3C12F}"/>
               </a:ext>
             </a:extLst>
           </p:cNvPr>
@@ -920,7 +930,7 @@
           <p:cNvPr id="3" name="内容占位符 2">
             <a:extLst>
               <a:ext uri="{FF2B5EF4-FFF2-40B4-BE49-F238E27FC236}">
-                <a16:creationId xmlns:a16="http://schemas.microsoft.com/office/drawing/2014/main" id="{F584FB0C-6A8B-426E-A027-B9F4A09C7E63}"/>
+                <a16:creationId xmlns:a16="http://schemas.microsoft.com/office/drawing/2014/main" xmlns="" id="{F584FB0C-6A8B-426E-A027-B9F4A09C7E63}"/>
               </a:ext>
             </a:extLst>
           </p:cNvPr>
@@ -977,7 +987,7 @@
           <p:cNvPr id="4" name="日期占位符 3">
             <a:extLst>
               <a:ext uri="{FF2B5EF4-FFF2-40B4-BE49-F238E27FC236}">
-                <a16:creationId xmlns:a16="http://schemas.microsoft.com/office/drawing/2014/main" id="{4CBA7492-79FB-4896-AF86-9F4EB7879C1A}"/>
+                <a16:creationId xmlns:a16="http://schemas.microsoft.com/office/drawing/2014/main" xmlns="" id="{4CBA7492-79FB-4896-AF86-9F4EB7879C1A}"/>
               </a:ext>
             </a:extLst>
           </p:cNvPr>
@@ -995,7 +1005,7 @@
           <a:p>
             <a:fld id="{219F432F-6DB3-43F6-A09E-69DBE75B6CC2}" type="datetimeFigureOut">
               <a:rPr lang="zh-CN" altLang="en-US" smtClean="0"/>
-              <a:t>2018-06-15</a:t>
+              <a:t>2018/6/15</a:t>
             </a:fld>
             <a:endParaRPr lang="zh-CN" altLang="en-US"/>
           </a:p>
@@ -1006,7 +1016,7 @@
           <p:cNvPr id="5" name="页脚占位符 4">
             <a:extLst>
               <a:ext uri="{FF2B5EF4-FFF2-40B4-BE49-F238E27FC236}">
-                <a16:creationId xmlns:a16="http://schemas.microsoft.com/office/drawing/2014/main" id="{0F0FBA8F-8EAD-49B7-88F0-CBCA01AE303F}"/>
+                <a16:creationId xmlns:a16="http://schemas.microsoft.com/office/drawing/2014/main" xmlns="" id="{0F0FBA8F-8EAD-49B7-88F0-CBCA01AE303F}"/>
               </a:ext>
             </a:extLst>
           </p:cNvPr>
@@ -1031,7 +1041,7 @@
           <p:cNvPr id="6" name="灯片编号占位符 5">
             <a:extLst>
               <a:ext uri="{FF2B5EF4-FFF2-40B4-BE49-F238E27FC236}">
-                <a16:creationId xmlns:a16="http://schemas.microsoft.com/office/drawing/2014/main" id="{080F2D4A-E7DA-4022-87EC-562F2B7B60B6}"/>
+                <a16:creationId xmlns:a16="http://schemas.microsoft.com/office/drawing/2014/main" xmlns="" id="{080F2D4A-E7DA-4022-87EC-562F2B7B60B6}"/>
               </a:ext>
             </a:extLst>
           </p:cNvPr>
@@ -1090,7 +1100,7 @@
           <p:cNvPr id="2" name="标题 1">
             <a:extLst>
               <a:ext uri="{FF2B5EF4-FFF2-40B4-BE49-F238E27FC236}">
-                <a16:creationId xmlns:a16="http://schemas.microsoft.com/office/drawing/2014/main" id="{AE75B17C-FE48-461B-BF44-91E9805EB0FA}"/>
+                <a16:creationId xmlns:a16="http://schemas.microsoft.com/office/drawing/2014/main" xmlns="" id="{AE75B17C-FE48-461B-BF44-91E9805EB0FA}"/>
               </a:ext>
             </a:extLst>
           </p:cNvPr>
@@ -1127,7 +1137,7 @@
           <p:cNvPr id="3" name="文本占位符 2">
             <a:extLst>
               <a:ext uri="{FF2B5EF4-FFF2-40B4-BE49-F238E27FC236}">
-                <a16:creationId xmlns:a16="http://schemas.microsoft.com/office/drawing/2014/main" id="{A1F1975D-171A-440A-A195-A8CD6EEBACDB}"/>
+                <a16:creationId xmlns:a16="http://schemas.microsoft.com/office/drawing/2014/main" xmlns="" id="{A1F1975D-171A-440A-A195-A8CD6EEBACDB}"/>
               </a:ext>
             </a:extLst>
           </p:cNvPr>
@@ -1252,7 +1262,7 @@
           <p:cNvPr id="4" name="日期占位符 3">
             <a:extLst>
               <a:ext uri="{FF2B5EF4-FFF2-40B4-BE49-F238E27FC236}">
-                <a16:creationId xmlns:a16="http://schemas.microsoft.com/office/drawing/2014/main" id="{E127E141-F231-4123-824F-6629E1617C61}"/>
+                <a16:creationId xmlns:a16="http://schemas.microsoft.com/office/drawing/2014/main" xmlns="" id="{E127E141-F231-4123-824F-6629E1617C61}"/>
               </a:ext>
             </a:extLst>
           </p:cNvPr>
@@ -1270,7 +1280,7 @@
           <a:p>
             <a:fld id="{219F432F-6DB3-43F6-A09E-69DBE75B6CC2}" type="datetimeFigureOut">
               <a:rPr lang="zh-CN" altLang="en-US" smtClean="0"/>
-              <a:t>2018-06-15</a:t>
+              <a:t>2018/6/15</a:t>
             </a:fld>
             <a:endParaRPr lang="zh-CN" altLang="en-US"/>
           </a:p>
@@ -1281,7 +1291,7 @@
           <p:cNvPr id="5" name="页脚占位符 4">
             <a:extLst>
               <a:ext uri="{FF2B5EF4-FFF2-40B4-BE49-F238E27FC236}">
-                <a16:creationId xmlns:a16="http://schemas.microsoft.com/office/drawing/2014/main" id="{56C078DE-0CE4-4DCB-A591-10E6B5DF96CE}"/>
+                <a16:creationId xmlns:a16="http://schemas.microsoft.com/office/drawing/2014/main" xmlns="" id="{56C078DE-0CE4-4DCB-A591-10E6B5DF96CE}"/>
               </a:ext>
             </a:extLst>
           </p:cNvPr>
@@ -1306,7 +1316,7 @@
           <p:cNvPr id="6" name="灯片编号占位符 5">
             <a:extLst>
               <a:ext uri="{FF2B5EF4-FFF2-40B4-BE49-F238E27FC236}">
-                <a16:creationId xmlns:a16="http://schemas.microsoft.com/office/drawing/2014/main" id="{FF737537-4552-4D68-9B5D-F9C24A454ECC}"/>
+                <a16:creationId xmlns:a16="http://schemas.microsoft.com/office/drawing/2014/main" xmlns="" id="{FF737537-4552-4D68-9B5D-F9C24A454ECC}"/>
               </a:ext>
             </a:extLst>
           </p:cNvPr>
@@ -1365,7 +1375,7 @@
           <p:cNvPr id="2" name="标题 1">
             <a:extLst>
               <a:ext uri="{FF2B5EF4-FFF2-40B4-BE49-F238E27FC236}">
-                <a16:creationId xmlns:a16="http://schemas.microsoft.com/office/drawing/2014/main" id="{E509CFD5-7726-48CE-93D8-0BC7A494D273}"/>
+                <a16:creationId xmlns:a16="http://schemas.microsoft.com/office/drawing/2014/main" xmlns="" id="{E509CFD5-7726-48CE-93D8-0BC7A494D273}"/>
               </a:ext>
             </a:extLst>
           </p:cNvPr>
@@ -1393,7 +1403,7 @@
           <p:cNvPr id="3" name="内容占位符 2">
             <a:extLst>
               <a:ext uri="{FF2B5EF4-FFF2-40B4-BE49-F238E27FC236}">
-                <a16:creationId xmlns:a16="http://schemas.microsoft.com/office/drawing/2014/main" id="{9B0BDB0F-A793-4992-99A8-43710980D9AF}"/>
+                <a16:creationId xmlns:a16="http://schemas.microsoft.com/office/drawing/2014/main" xmlns="" id="{9B0BDB0F-A793-4992-99A8-43710980D9AF}"/>
               </a:ext>
             </a:extLst>
           </p:cNvPr>
@@ -1455,7 +1465,7 @@
           <p:cNvPr id="4" name="内容占位符 3">
             <a:extLst>
               <a:ext uri="{FF2B5EF4-FFF2-40B4-BE49-F238E27FC236}">
-                <a16:creationId xmlns:a16="http://schemas.microsoft.com/office/drawing/2014/main" id="{2E6668B3-8787-4E45-936C-53B9F35DC43D}"/>
+                <a16:creationId xmlns:a16="http://schemas.microsoft.com/office/drawing/2014/main" xmlns="" id="{2E6668B3-8787-4E45-936C-53B9F35DC43D}"/>
               </a:ext>
             </a:extLst>
           </p:cNvPr>
@@ -1517,7 +1527,7 @@
           <p:cNvPr id="5" name="日期占位符 4">
             <a:extLst>
               <a:ext uri="{FF2B5EF4-FFF2-40B4-BE49-F238E27FC236}">
-                <a16:creationId xmlns:a16="http://schemas.microsoft.com/office/drawing/2014/main" id="{A9C22122-AFAD-47A9-9333-DBD53912EDF8}"/>
+                <a16:creationId xmlns:a16="http://schemas.microsoft.com/office/drawing/2014/main" xmlns="" id="{A9C22122-AFAD-47A9-9333-DBD53912EDF8}"/>
               </a:ext>
             </a:extLst>
           </p:cNvPr>
@@ -1535,7 +1545,7 @@
           <a:p>
             <a:fld id="{219F432F-6DB3-43F6-A09E-69DBE75B6CC2}" type="datetimeFigureOut">
               <a:rPr lang="zh-CN" altLang="en-US" smtClean="0"/>
-              <a:t>2018-06-15</a:t>
+              <a:t>2018/6/15</a:t>
             </a:fld>
             <a:endParaRPr lang="zh-CN" altLang="en-US"/>
           </a:p>
@@ -1546,7 +1556,7 @@
           <p:cNvPr id="6" name="页脚占位符 5">
             <a:extLst>
               <a:ext uri="{FF2B5EF4-FFF2-40B4-BE49-F238E27FC236}">
-                <a16:creationId xmlns:a16="http://schemas.microsoft.com/office/drawing/2014/main" id="{537C3544-C57B-456F-8AE4-2BD4F239CD73}"/>
+                <a16:creationId xmlns:a16="http://schemas.microsoft.com/office/drawing/2014/main" xmlns="" id="{537C3544-C57B-456F-8AE4-2BD4F239CD73}"/>
               </a:ext>
             </a:extLst>
           </p:cNvPr>
@@ -1571,7 +1581,7 @@
           <p:cNvPr id="7" name="灯片编号占位符 6">
             <a:extLst>
               <a:ext uri="{FF2B5EF4-FFF2-40B4-BE49-F238E27FC236}">
-                <a16:creationId xmlns:a16="http://schemas.microsoft.com/office/drawing/2014/main" id="{08C92F58-2447-4302-A776-F05F4022FCF9}"/>
+                <a16:creationId xmlns:a16="http://schemas.microsoft.com/office/drawing/2014/main" xmlns="" id="{08C92F58-2447-4302-A776-F05F4022FCF9}"/>
               </a:ext>
             </a:extLst>
           </p:cNvPr>
@@ -1630,7 +1640,7 @@
           <p:cNvPr id="2" name="标题 1">
             <a:extLst>
               <a:ext uri="{FF2B5EF4-FFF2-40B4-BE49-F238E27FC236}">
-                <a16:creationId xmlns:a16="http://schemas.microsoft.com/office/drawing/2014/main" id="{8652C284-9A56-4A3E-BDD4-00997D25E09A}"/>
+                <a16:creationId xmlns:a16="http://schemas.microsoft.com/office/drawing/2014/main" xmlns="" id="{8652C284-9A56-4A3E-BDD4-00997D25E09A}"/>
               </a:ext>
             </a:extLst>
           </p:cNvPr>
@@ -1663,7 +1673,7 @@
           <p:cNvPr id="3" name="文本占位符 2">
             <a:extLst>
               <a:ext uri="{FF2B5EF4-FFF2-40B4-BE49-F238E27FC236}">
-                <a16:creationId xmlns:a16="http://schemas.microsoft.com/office/drawing/2014/main" id="{B2696515-7A33-40F7-8C61-5BC3F8BA31E4}"/>
+                <a16:creationId xmlns:a16="http://schemas.microsoft.com/office/drawing/2014/main" xmlns="" id="{B2696515-7A33-40F7-8C61-5BC3F8BA31E4}"/>
               </a:ext>
             </a:extLst>
           </p:cNvPr>
@@ -1734,7 +1744,7 @@
           <p:cNvPr id="4" name="内容占位符 3">
             <a:extLst>
               <a:ext uri="{FF2B5EF4-FFF2-40B4-BE49-F238E27FC236}">
-                <a16:creationId xmlns:a16="http://schemas.microsoft.com/office/drawing/2014/main" id="{03136F71-64F8-4812-BCBB-F2E1177A378C}"/>
+                <a16:creationId xmlns:a16="http://schemas.microsoft.com/office/drawing/2014/main" xmlns="" id="{03136F71-64F8-4812-BCBB-F2E1177A378C}"/>
               </a:ext>
             </a:extLst>
           </p:cNvPr>
@@ -1796,7 +1806,7 @@
           <p:cNvPr id="5" name="文本占位符 4">
             <a:extLst>
               <a:ext uri="{FF2B5EF4-FFF2-40B4-BE49-F238E27FC236}">
-                <a16:creationId xmlns:a16="http://schemas.microsoft.com/office/drawing/2014/main" id="{69F70579-52BE-415C-BC5E-366B88431CC4}"/>
+                <a16:creationId xmlns:a16="http://schemas.microsoft.com/office/drawing/2014/main" xmlns="" id="{69F70579-52BE-415C-BC5E-366B88431CC4}"/>
               </a:ext>
             </a:extLst>
           </p:cNvPr>
@@ -1867,7 +1877,7 @@
           <p:cNvPr id="6" name="内容占位符 5">
             <a:extLst>
               <a:ext uri="{FF2B5EF4-FFF2-40B4-BE49-F238E27FC236}">
-                <a16:creationId xmlns:a16="http://schemas.microsoft.com/office/drawing/2014/main" id="{5453ED2F-14EA-47EA-9505-E3C3E1417D60}"/>
+                <a16:creationId xmlns:a16="http://schemas.microsoft.com/office/drawing/2014/main" xmlns="" id="{5453ED2F-14EA-47EA-9505-E3C3E1417D60}"/>
               </a:ext>
             </a:extLst>
           </p:cNvPr>
@@ -1929,7 +1939,7 @@
           <p:cNvPr id="7" name="日期占位符 6">
             <a:extLst>
               <a:ext uri="{FF2B5EF4-FFF2-40B4-BE49-F238E27FC236}">
-                <a16:creationId xmlns:a16="http://schemas.microsoft.com/office/drawing/2014/main" id="{5ADB03B3-8AF7-4DA7-B52F-D776D40AF98C}"/>
+                <a16:creationId xmlns:a16="http://schemas.microsoft.com/office/drawing/2014/main" xmlns="" id="{5ADB03B3-8AF7-4DA7-B52F-D776D40AF98C}"/>
               </a:ext>
             </a:extLst>
           </p:cNvPr>
@@ -1947,7 +1957,7 @@
           <a:p>
             <a:fld id="{219F432F-6DB3-43F6-A09E-69DBE75B6CC2}" type="datetimeFigureOut">
               <a:rPr lang="zh-CN" altLang="en-US" smtClean="0"/>
-              <a:t>2018-06-15</a:t>
+              <a:t>2018/6/15</a:t>
             </a:fld>
             <a:endParaRPr lang="zh-CN" altLang="en-US"/>
           </a:p>
@@ -1958,7 +1968,7 @@
           <p:cNvPr id="8" name="页脚占位符 7">
             <a:extLst>
               <a:ext uri="{FF2B5EF4-FFF2-40B4-BE49-F238E27FC236}">
-                <a16:creationId xmlns:a16="http://schemas.microsoft.com/office/drawing/2014/main" id="{AD87D1CD-1E68-440A-806A-2559A430A1B4}"/>
+                <a16:creationId xmlns:a16="http://schemas.microsoft.com/office/drawing/2014/main" xmlns="" id="{AD87D1CD-1E68-440A-806A-2559A430A1B4}"/>
               </a:ext>
             </a:extLst>
           </p:cNvPr>
@@ -1983,7 +1993,7 @@
           <p:cNvPr id="9" name="灯片编号占位符 8">
             <a:extLst>
               <a:ext uri="{FF2B5EF4-FFF2-40B4-BE49-F238E27FC236}">
-                <a16:creationId xmlns:a16="http://schemas.microsoft.com/office/drawing/2014/main" id="{CC2094F8-7D52-4BDB-877C-A39A8B91A951}"/>
+                <a16:creationId xmlns:a16="http://schemas.microsoft.com/office/drawing/2014/main" xmlns="" id="{CC2094F8-7D52-4BDB-877C-A39A8B91A951}"/>
               </a:ext>
             </a:extLst>
           </p:cNvPr>
@@ -2042,7 +2052,7 @@
           <p:cNvPr id="2" name="标题 1">
             <a:extLst>
               <a:ext uri="{FF2B5EF4-FFF2-40B4-BE49-F238E27FC236}">
-                <a16:creationId xmlns:a16="http://schemas.microsoft.com/office/drawing/2014/main" id="{C512544C-E8BA-401B-B126-491DD15C7CAD}"/>
+                <a16:creationId xmlns:a16="http://schemas.microsoft.com/office/drawing/2014/main" xmlns="" id="{C512544C-E8BA-401B-B126-491DD15C7CAD}"/>
               </a:ext>
             </a:extLst>
           </p:cNvPr>
@@ -2070,7 +2080,7 @@
           <p:cNvPr id="3" name="日期占位符 2">
             <a:extLst>
               <a:ext uri="{FF2B5EF4-FFF2-40B4-BE49-F238E27FC236}">
-                <a16:creationId xmlns:a16="http://schemas.microsoft.com/office/drawing/2014/main" id="{A83BD709-FC0C-4ED6-9098-494D3C002B86}"/>
+                <a16:creationId xmlns:a16="http://schemas.microsoft.com/office/drawing/2014/main" xmlns="" id="{A83BD709-FC0C-4ED6-9098-494D3C002B86}"/>
               </a:ext>
             </a:extLst>
           </p:cNvPr>
@@ -2088,7 +2098,7 @@
           <a:p>
             <a:fld id="{219F432F-6DB3-43F6-A09E-69DBE75B6CC2}" type="datetimeFigureOut">
               <a:rPr lang="zh-CN" altLang="en-US" smtClean="0"/>
-              <a:t>2018-06-15</a:t>
+              <a:t>2018/6/15</a:t>
             </a:fld>
             <a:endParaRPr lang="zh-CN" altLang="en-US"/>
           </a:p>
@@ -2099,7 +2109,7 @@
           <p:cNvPr id="4" name="页脚占位符 3">
             <a:extLst>
               <a:ext uri="{FF2B5EF4-FFF2-40B4-BE49-F238E27FC236}">
-                <a16:creationId xmlns:a16="http://schemas.microsoft.com/office/drawing/2014/main" id="{E56E190A-27D0-4E63-8DB7-7B8757D06DC9}"/>
+                <a16:creationId xmlns:a16="http://schemas.microsoft.com/office/drawing/2014/main" xmlns="" id="{E56E190A-27D0-4E63-8DB7-7B8757D06DC9}"/>
               </a:ext>
             </a:extLst>
           </p:cNvPr>
@@ -2124,7 +2134,7 @@
           <p:cNvPr id="5" name="灯片编号占位符 4">
             <a:extLst>
               <a:ext uri="{FF2B5EF4-FFF2-40B4-BE49-F238E27FC236}">
-                <a16:creationId xmlns:a16="http://schemas.microsoft.com/office/drawing/2014/main" id="{046E1CC3-45E0-4CE4-8C8D-5494961C9AE3}"/>
+                <a16:creationId xmlns:a16="http://schemas.microsoft.com/office/drawing/2014/main" xmlns="" id="{046E1CC3-45E0-4CE4-8C8D-5494961C9AE3}"/>
               </a:ext>
             </a:extLst>
           </p:cNvPr>
@@ -2183,7 +2193,7 @@
           <p:cNvPr id="2" name="日期占位符 1">
             <a:extLst>
               <a:ext uri="{FF2B5EF4-FFF2-40B4-BE49-F238E27FC236}">
-                <a16:creationId xmlns:a16="http://schemas.microsoft.com/office/drawing/2014/main" id="{8E3FA396-A357-489A-B19A-C24F0DFBE33F}"/>
+                <a16:creationId xmlns:a16="http://schemas.microsoft.com/office/drawing/2014/main" xmlns="" id="{8E3FA396-A357-489A-B19A-C24F0DFBE33F}"/>
               </a:ext>
             </a:extLst>
           </p:cNvPr>
@@ -2201,7 +2211,7 @@
           <a:p>
             <a:fld id="{219F432F-6DB3-43F6-A09E-69DBE75B6CC2}" type="datetimeFigureOut">
               <a:rPr lang="zh-CN" altLang="en-US" smtClean="0"/>
-              <a:t>2018-06-15</a:t>
+              <a:t>2018/6/15</a:t>
             </a:fld>
             <a:endParaRPr lang="zh-CN" altLang="en-US"/>
           </a:p>
@@ -2212,7 +2222,7 @@
           <p:cNvPr id="3" name="页脚占位符 2">
             <a:extLst>
               <a:ext uri="{FF2B5EF4-FFF2-40B4-BE49-F238E27FC236}">
-                <a16:creationId xmlns:a16="http://schemas.microsoft.com/office/drawing/2014/main" id="{F2AA3B45-697A-4D1F-8495-66692B2A4FB9}"/>
+                <a16:creationId xmlns:a16="http://schemas.microsoft.com/office/drawing/2014/main" xmlns="" id="{F2AA3B45-697A-4D1F-8495-66692B2A4FB9}"/>
               </a:ext>
             </a:extLst>
           </p:cNvPr>
@@ -2237,7 +2247,7 @@
           <p:cNvPr id="4" name="灯片编号占位符 3">
             <a:extLst>
               <a:ext uri="{FF2B5EF4-FFF2-40B4-BE49-F238E27FC236}">
-                <a16:creationId xmlns:a16="http://schemas.microsoft.com/office/drawing/2014/main" id="{8748A1F4-D909-4A33-ACCA-9FFB0E669210}"/>
+                <a16:creationId xmlns:a16="http://schemas.microsoft.com/office/drawing/2014/main" xmlns="" id="{8748A1F4-D909-4A33-ACCA-9FFB0E669210}"/>
               </a:ext>
             </a:extLst>
           </p:cNvPr>
@@ -2296,7 +2306,7 @@
           <p:cNvPr id="2" name="标题 1">
             <a:extLst>
               <a:ext uri="{FF2B5EF4-FFF2-40B4-BE49-F238E27FC236}">
-                <a16:creationId xmlns:a16="http://schemas.microsoft.com/office/drawing/2014/main" id="{1E0F9800-D782-44B3-8689-717E7AC29913}"/>
+                <a16:creationId xmlns:a16="http://schemas.microsoft.com/office/drawing/2014/main" xmlns="" id="{1E0F9800-D782-44B3-8689-717E7AC29913}"/>
               </a:ext>
             </a:extLst>
           </p:cNvPr>
@@ -2333,7 +2343,7 @@
           <p:cNvPr id="3" name="内容占位符 2">
             <a:extLst>
               <a:ext uri="{FF2B5EF4-FFF2-40B4-BE49-F238E27FC236}">
-                <a16:creationId xmlns:a16="http://schemas.microsoft.com/office/drawing/2014/main" id="{6B33FD70-4A53-4BE9-867A-92B3BBA621FF}"/>
+                <a16:creationId xmlns:a16="http://schemas.microsoft.com/office/drawing/2014/main" xmlns="" id="{6B33FD70-4A53-4BE9-867A-92B3BBA621FF}"/>
               </a:ext>
             </a:extLst>
           </p:cNvPr>
@@ -2423,7 +2433,7 @@
           <p:cNvPr id="4" name="文本占位符 3">
             <a:extLst>
               <a:ext uri="{FF2B5EF4-FFF2-40B4-BE49-F238E27FC236}">
-                <a16:creationId xmlns:a16="http://schemas.microsoft.com/office/drawing/2014/main" id="{2BB25E75-0F96-4627-AA61-6EA2397E4312}"/>
+                <a16:creationId xmlns:a16="http://schemas.microsoft.com/office/drawing/2014/main" xmlns="" id="{2BB25E75-0F96-4627-AA61-6EA2397E4312}"/>
               </a:ext>
             </a:extLst>
           </p:cNvPr>
@@ -2494,7 +2504,7 @@
           <p:cNvPr id="5" name="日期占位符 4">
             <a:extLst>
               <a:ext uri="{FF2B5EF4-FFF2-40B4-BE49-F238E27FC236}">
-                <a16:creationId xmlns:a16="http://schemas.microsoft.com/office/drawing/2014/main" id="{43FE375F-6D19-405C-8DF6-A15D782C454B}"/>
+                <a16:creationId xmlns:a16="http://schemas.microsoft.com/office/drawing/2014/main" xmlns="" id="{43FE375F-6D19-405C-8DF6-A15D782C454B}"/>
               </a:ext>
             </a:extLst>
           </p:cNvPr>
@@ -2512,7 +2522,7 @@
           <a:p>
             <a:fld id="{219F432F-6DB3-43F6-A09E-69DBE75B6CC2}" type="datetimeFigureOut">
               <a:rPr lang="zh-CN" altLang="en-US" smtClean="0"/>
-              <a:t>2018-06-15</a:t>
+              <a:t>2018/6/15</a:t>
             </a:fld>
             <a:endParaRPr lang="zh-CN" altLang="en-US"/>
           </a:p>
@@ -2523,7 +2533,7 @@
           <p:cNvPr id="6" name="页脚占位符 5">
             <a:extLst>
               <a:ext uri="{FF2B5EF4-FFF2-40B4-BE49-F238E27FC236}">
-                <a16:creationId xmlns:a16="http://schemas.microsoft.com/office/drawing/2014/main" id="{E8E4085D-A8FB-4D3A-B4E4-38DED35C8259}"/>
+                <a16:creationId xmlns:a16="http://schemas.microsoft.com/office/drawing/2014/main" xmlns="" id="{E8E4085D-A8FB-4D3A-B4E4-38DED35C8259}"/>
               </a:ext>
             </a:extLst>
           </p:cNvPr>
@@ -2548,7 +2558,7 @@
           <p:cNvPr id="7" name="灯片编号占位符 6">
             <a:extLst>
               <a:ext uri="{FF2B5EF4-FFF2-40B4-BE49-F238E27FC236}">
-                <a16:creationId xmlns:a16="http://schemas.microsoft.com/office/drawing/2014/main" id="{03122818-E9DA-48E6-A097-75D2DED3790A}"/>
+                <a16:creationId xmlns:a16="http://schemas.microsoft.com/office/drawing/2014/main" xmlns="" id="{03122818-E9DA-48E6-A097-75D2DED3790A}"/>
               </a:ext>
             </a:extLst>
           </p:cNvPr>
@@ -2607,7 +2617,7 @@
           <p:cNvPr id="2" name="标题 1">
             <a:extLst>
               <a:ext uri="{FF2B5EF4-FFF2-40B4-BE49-F238E27FC236}">
-                <a16:creationId xmlns:a16="http://schemas.microsoft.com/office/drawing/2014/main" id="{1BC4AD3E-3968-4BB4-AB6C-499649A046E0}"/>
+                <a16:creationId xmlns:a16="http://schemas.microsoft.com/office/drawing/2014/main" xmlns="" id="{1BC4AD3E-3968-4BB4-AB6C-499649A046E0}"/>
               </a:ext>
             </a:extLst>
           </p:cNvPr>
@@ -2644,7 +2654,7 @@
           <p:cNvPr id="3" name="图片占位符 2">
             <a:extLst>
               <a:ext uri="{FF2B5EF4-FFF2-40B4-BE49-F238E27FC236}">
-                <a16:creationId xmlns:a16="http://schemas.microsoft.com/office/drawing/2014/main" id="{7B2E7D4F-6E6B-434A-96E9-D3B4F3A206BF}"/>
+                <a16:creationId xmlns:a16="http://schemas.microsoft.com/office/drawing/2014/main" xmlns="" id="{7B2E7D4F-6E6B-434A-96E9-D3B4F3A206BF}"/>
               </a:ext>
             </a:extLst>
           </p:cNvPr>
@@ -2711,7 +2721,7 @@
           <p:cNvPr id="4" name="文本占位符 3">
             <a:extLst>
               <a:ext uri="{FF2B5EF4-FFF2-40B4-BE49-F238E27FC236}">
-                <a16:creationId xmlns:a16="http://schemas.microsoft.com/office/drawing/2014/main" id="{AAF1CA8B-C912-4108-A0CD-55F85B55C180}"/>
+                <a16:creationId xmlns:a16="http://schemas.microsoft.com/office/drawing/2014/main" xmlns="" id="{AAF1CA8B-C912-4108-A0CD-55F85B55C180}"/>
               </a:ext>
             </a:extLst>
           </p:cNvPr>
@@ -2782,7 +2792,7 @@
           <p:cNvPr id="5" name="日期占位符 4">
             <a:extLst>
               <a:ext uri="{FF2B5EF4-FFF2-40B4-BE49-F238E27FC236}">
-                <a16:creationId xmlns:a16="http://schemas.microsoft.com/office/drawing/2014/main" id="{94DEC0E0-4B2E-4A53-A576-E6230B5E9370}"/>
+                <a16:creationId xmlns:a16="http://schemas.microsoft.com/office/drawing/2014/main" xmlns="" id="{94DEC0E0-4B2E-4A53-A576-E6230B5E9370}"/>
               </a:ext>
             </a:extLst>
           </p:cNvPr>
@@ -2800,7 +2810,7 @@
           <a:p>
             <a:fld id="{219F432F-6DB3-43F6-A09E-69DBE75B6CC2}" type="datetimeFigureOut">
               <a:rPr lang="zh-CN" altLang="en-US" smtClean="0"/>
-              <a:t>2018-06-15</a:t>
+              <a:t>2018/6/15</a:t>
             </a:fld>
             <a:endParaRPr lang="zh-CN" altLang="en-US"/>
           </a:p>
@@ -2811,7 +2821,7 @@
           <p:cNvPr id="6" name="页脚占位符 5">
             <a:extLst>
               <a:ext uri="{FF2B5EF4-FFF2-40B4-BE49-F238E27FC236}">
-                <a16:creationId xmlns:a16="http://schemas.microsoft.com/office/drawing/2014/main" id="{16B1E624-D052-41CC-90BF-B77CC2FC9E28}"/>
+                <a16:creationId xmlns:a16="http://schemas.microsoft.com/office/drawing/2014/main" xmlns="" id="{16B1E624-D052-41CC-90BF-B77CC2FC9E28}"/>
               </a:ext>
             </a:extLst>
           </p:cNvPr>
@@ -2836,7 +2846,7 @@
           <p:cNvPr id="7" name="灯片编号占位符 6">
             <a:extLst>
               <a:ext uri="{FF2B5EF4-FFF2-40B4-BE49-F238E27FC236}">
-                <a16:creationId xmlns:a16="http://schemas.microsoft.com/office/drawing/2014/main" id="{4A108E37-93C1-4989-BB26-06B138AD56A9}"/>
+                <a16:creationId xmlns:a16="http://schemas.microsoft.com/office/drawing/2014/main" xmlns="" id="{4A108E37-93C1-4989-BB26-06B138AD56A9}"/>
               </a:ext>
             </a:extLst>
           </p:cNvPr>
@@ -2900,7 +2910,7 @@
           <p:cNvPr id="2" name="标题占位符 1">
             <a:extLst>
               <a:ext uri="{FF2B5EF4-FFF2-40B4-BE49-F238E27FC236}">
-                <a16:creationId xmlns:a16="http://schemas.microsoft.com/office/drawing/2014/main" id="{9F48DC56-307F-48C1-8149-59591A5E49D7}"/>
+                <a16:creationId xmlns:a16="http://schemas.microsoft.com/office/drawing/2014/main" xmlns="" id="{9F48DC56-307F-48C1-8149-59591A5E49D7}"/>
               </a:ext>
             </a:extLst>
           </p:cNvPr>
@@ -2938,7 +2948,7 @@
           <p:cNvPr id="3" name="文本占位符 2">
             <a:extLst>
               <a:ext uri="{FF2B5EF4-FFF2-40B4-BE49-F238E27FC236}">
-                <a16:creationId xmlns:a16="http://schemas.microsoft.com/office/drawing/2014/main" id="{9251A505-696A-4259-9E02-14DF50390457}"/>
+                <a16:creationId xmlns:a16="http://schemas.microsoft.com/office/drawing/2014/main" xmlns="" id="{9251A505-696A-4259-9E02-14DF50390457}"/>
               </a:ext>
             </a:extLst>
           </p:cNvPr>
@@ -3005,7 +3015,7 @@
           <p:cNvPr id="4" name="日期占位符 3">
             <a:extLst>
               <a:ext uri="{FF2B5EF4-FFF2-40B4-BE49-F238E27FC236}">
-                <a16:creationId xmlns:a16="http://schemas.microsoft.com/office/drawing/2014/main" id="{B63AD228-CA3B-4AA9-83AD-922BC45F33C1}"/>
+                <a16:creationId xmlns:a16="http://schemas.microsoft.com/office/drawing/2014/main" xmlns="" id="{B63AD228-CA3B-4AA9-83AD-922BC45F33C1}"/>
               </a:ext>
             </a:extLst>
           </p:cNvPr>
@@ -3041,7 +3051,7 @@
           <a:p>
             <a:fld id="{219F432F-6DB3-43F6-A09E-69DBE75B6CC2}" type="datetimeFigureOut">
               <a:rPr lang="zh-CN" altLang="en-US" smtClean="0"/>
-              <a:t>2018-06-15</a:t>
+              <a:t>2018/6/15</a:t>
             </a:fld>
             <a:endParaRPr lang="zh-CN" altLang="en-US"/>
           </a:p>
@@ -3052,7 +3062,7 @@
           <p:cNvPr id="5" name="页脚占位符 4">
             <a:extLst>
               <a:ext uri="{FF2B5EF4-FFF2-40B4-BE49-F238E27FC236}">
-                <a16:creationId xmlns:a16="http://schemas.microsoft.com/office/drawing/2014/main" id="{5EF99471-2FC8-4DEC-99AE-D48D78DE00AE}"/>
+                <a16:creationId xmlns:a16="http://schemas.microsoft.com/office/drawing/2014/main" xmlns="" id="{5EF99471-2FC8-4DEC-99AE-D48D78DE00AE}"/>
               </a:ext>
             </a:extLst>
           </p:cNvPr>
@@ -3095,7 +3105,7 @@
           <p:cNvPr id="6" name="灯片编号占位符 5">
             <a:extLst>
               <a:ext uri="{FF2B5EF4-FFF2-40B4-BE49-F238E27FC236}">
-                <a16:creationId xmlns:a16="http://schemas.microsoft.com/office/drawing/2014/main" id="{15D15BD5-36FE-43A6-B38D-9F63C1B47044}"/>
+                <a16:creationId xmlns:a16="http://schemas.microsoft.com/office/drawing/2014/main" xmlns="" id="{15D15BD5-36FE-43A6-B38D-9F63C1B47044}"/>
               </a:ext>
             </a:extLst>
           </p:cNvPr>
@@ -3553,7 +3563,7 @@
           </a:prstGeom>
           <a:extLst>
             <a:ext uri="{C572A759-6A51-4108-AA02-DFA0A04FC94B}">
-              <ma14:wrappingTextBoxFlag xmlns="" xmlns:ma14="http://schemas.microsoft.com/office/mac/drawingml/2011/main" val="1"/>
+              <ma14:wrappingTextBoxFlag xmlns:ma14="http://schemas.microsoft.com/office/mac/drawingml/2011/main" val="1"/>
             </a:ext>
           </a:extLst>
         </p:spPr>
@@ -3581,6 +3591,414 @@
     <p:extLst>
       <p:ext uri="{BB962C8B-B14F-4D97-AF65-F5344CB8AC3E}">
         <p14:creationId xmlns:p14="http://schemas.microsoft.com/office/powerpoint/2010/main" val="1220636248"/>
+      </p:ext>
+    </p:extLst>
+  </p:cSld>
+  <p:clrMapOvr>
+    <a:masterClrMapping/>
+  </p:clrMapOvr>
+</p:sld>
+</file>
+
+<file path=ppt/slides/slide10.xml><?xml version="1.0" encoding="utf-8"?>
+<p:sld xmlns:a="http://schemas.openxmlformats.org/drawingml/2006/main" xmlns:r="http://schemas.openxmlformats.org/officeDocument/2006/relationships" xmlns:p="http://schemas.openxmlformats.org/presentationml/2006/main">
+  <p:cSld>
+    <p:spTree>
+      <p:nvGrpSpPr>
+        <p:cNvPr id="1" name=""/>
+        <p:cNvGrpSpPr/>
+        <p:nvPr/>
+      </p:nvGrpSpPr>
+      <p:grpSpPr>
+        <a:xfrm>
+          <a:off x="0" y="0"/>
+          <a:ext cx="0" cy="0"/>
+          <a:chOff x="0" y="0"/>
+          <a:chExt cx="0" cy="0"/>
+        </a:xfrm>
+      </p:grpSpPr>
+      <p:sp>
+        <p:nvSpPr>
+          <p:cNvPr id="2" name="标题 1">
+            <a:extLst>
+              <a:ext uri="{FF2B5EF4-FFF2-40B4-BE49-F238E27FC236}">
+                <a16:creationId xmlns:a16="http://schemas.microsoft.com/office/drawing/2014/main" xmlns="" id="{544BA2BB-8171-4768-806B-1215B8F01099}"/>
+              </a:ext>
+            </a:extLst>
+          </p:cNvPr>
+          <p:cNvSpPr>
+            <a:spLocks noGrp="1"/>
+          </p:cNvSpPr>
+          <p:nvPr>
+            <p:ph type="title"/>
+          </p:nvPr>
+        </p:nvSpPr>
+        <p:spPr/>
+        <p:txBody>
+          <a:bodyPr/>
+          <a:lstStyle/>
+          <a:p>
+            <a:r>
+              <a:rPr lang="zh-CN" altLang="en-US" dirty="0"/>
+              <a:t>用户态的相关工具</a:t>
+            </a:r>
+          </a:p>
+        </p:txBody>
+      </p:sp>
+      <p:sp>
+        <p:nvSpPr>
+          <p:cNvPr id="3" name="文本占位符 2">
+            <a:extLst>
+              <a:ext uri="{FF2B5EF4-FFF2-40B4-BE49-F238E27FC236}">
+                <a16:creationId xmlns:a16="http://schemas.microsoft.com/office/drawing/2014/main" xmlns="" id="{7F621652-1B47-45C5-BB2E-97F9520D27A0}"/>
+              </a:ext>
+            </a:extLst>
+          </p:cNvPr>
+          <p:cNvSpPr>
+            <a:spLocks noGrp="1"/>
+          </p:cNvSpPr>
+          <p:nvPr>
+            <p:ph type="body" idx="1"/>
+          </p:nvPr>
+        </p:nvSpPr>
+        <p:spPr/>
+        <p:txBody>
+          <a:bodyPr/>
+          <a:lstStyle/>
+          <a:p>
+            <a:r>
+              <a:rPr lang="en-US" altLang="zh-CN" dirty="0" err="1"/>
+              <a:t>insmod</a:t>
+            </a:r>
+            <a:r>
+              <a:rPr lang="zh-CN" altLang="en-US" dirty="0"/>
+              <a:t>：用户态的</a:t>
+            </a:r>
+            <a:r>
+              <a:rPr lang="en-US" altLang="zh-CN" dirty="0"/>
+              <a:t>LKM</a:t>
+            </a:r>
+            <a:r>
+              <a:rPr lang="zh-CN" altLang="en-US" dirty="0"/>
+              <a:t>加载工具</a:t>
+            </a:r>
+            <a:endParaRPr lang="en-US" altLang="zh-CN" dirty="0"/>
+          </a:p>
+          <a:p>
+            <a:pPr lvl="1"/>
+            <a:r>
+              <a:rPr lang="zh-CN" altLang="en-US" dirty="0"/>
+              <a:t>检查</a:t>
+            </a:r>
+            <a:r>
+              <a:rPr lang="en-US" altLang="zh-CN" dirty="0"/>
+              <a:t>dependency</a:t>
+            </a:r>
+            <a:r>
+              <a:rPr lang="zh-CN" altLang="en-US" dirty="0"/>
+              <a:t>：</a:t>
+            </a:r>
+            <a:r>
+              <a:rPr lang="en-US" altLang="zh-CN" dirty="0"/>
+              <a:t> dependency</a:t>
+            </a:r>
+            <a:r>
+              <a:rPr lang="zh-CN" altLang="en-US" dirty="0"/>
+              <a:t>在文本文件</a:t>
+            </a:r>
+            <a:r>
+              <a:rPr lang="en-US" altLang="zh-CN" dirty="0" err="1"/>
+              <a:t>mod.dep</a:t>
+            </a:r>
+            <a:r>
+              <a:rPr lang="zh-CN" altLang="en-US" dirty="0"/>
+              <a:t>定义，每行表示一项规则。“</a:t>
+            </a:r>
+            <a:r>
+              <a:rPr lang="en-US" altLang="zh-CN" dirty="0"/>
+              <a:t>mod: m1 m2 …</a:t>
+            </a:r>
+            <a:r>
+              <a:rPr lang="zh-CN" altLang="en-US" dirty="0"/>
+              <a:t>”表示</a:t>
+            </a:r>
+            <a:r>
+              <a:rPr lang="en-US" altLang="zh-CN" dirty="0"/>
+              <a:t>mod</a:t>
+            </a:r>
+            <a:r>
+              <a:rPr lang="zh-CN" altLang="en-US" dirty="0"/>
+              <a:t>依赖</a:t>
+            </a:r>
+            <a:r>
+              <a:rPr lang="en-US" altLang="zh-CN" dirty="0"/>
+              <a:t>m1</a:t>
+            </a:r>
+            <a:r>
+              <a:rPr lang="zh-CN" altLang="en-US" dirty="0"/>
+              <a:t>、</a:t>
+            </a:r>
+            <a:r>
+              <a:rPr lang="en-US" altLang="zh-CN" dirty="0"/>
+              <a:t>m2</a:t>
+            </a:r>
+            <a:r>
+              <a:rPr lang="zh-CN" altLang="en-US" dirty="0"/>
+              <a:t>、</a:t>
+            </a:r>
+            <a:r>
+              <a:rPr lang="en-US" altLang="zh-CN" dirty="0"/>
+              <a:t>…</a:t>
+            </a:r>
+            <a:r>
+              <a:rPr lang="zh-CN" altLang="en-US" dirty="0"/>
+              <a:t>，</a:t>
+            </a:r>
+            <a:r>
+              <a:rPr lang="en-US" altLang="zh-CN" dirty="0"/>
+              <a:t>m1</a:t>
+            </a:r>
+            <a:r>
+              <a:rPr lang="zh-CN" altLang="en-US" dirty="0"/>
+              <a:t>、</a:t>
+            </a:r>
+            <a:r>
+              <a:rPr lang="en-US" altLang="zh-CN" dirty="0"/>
+              <a:t>m2</a:t>
+            </a:r>
+            <a:r>
+              <a:rPr lang="zh-CN" altLang="en-US" dirty="0"/>
+              <a:t>、</a:t>
+            </a:r>
+            <a:r>
+              <a:rPr lang="en-US" altLang="zh-CN" dirty="0"/>
+              <a:t>…</a:t>
+            </a:r>
+            <a:r>
+              <a:rPr lang="zh-CN" altLang="en-US" dirty="0"/>
+              <a:t>需要按照依赖关系拓扑排序</a:t>
+            </a:r>
+            <a:endParaRPr lang="en-US" altLang="zh-CN" dirty="0"/>
+          </a:p>
+          <a:p>
+            <a:pPr lvl="1"/>
+            <a:r>
+              <a:rPr lang="zh-CN" altLang="en-US" dirty="0"/>
+              <a:t>加载</a:t>
+            </a:r>
+            <a:r>
+              <a:rPr lang="en-US" altLang="zh-CN" dirty="0"/>
+              <a:t>module</a:t>
+            </a:r>
+            <a:r>
+              <a:rPr lang="zh-CN" altLang="en-US" dirty="0"/>
+              <a:t>：调用</a:t>
+            </a:r>
+            <a:r>
+              <a:rPr lang="en-US" altLang="zh-CN" dirty="0" err="1"/>
+              <a:t>SYS_init_module</a:t>
+            </a:r>
+            <a:r>
+              <a:rPr lang="zh-CN" altLang="en-US" dirty="0"/>
+              <a:t>，参数为文件名</a:t>
+            </a:r>
+            <a:endParaRPr lang="en-US" altLang="zh-CN" dirty="0"/>
+          </a:p>
+          <a:p>
+            <a:r>
+              <a:rPr lang="en-US" altLang="zh-CN" dirty="0" err="1"/>
+              <a:t>rmmod</a:t>
+            </a:r>
+            <a:r>
+              <a:rPr lang="zh-CN" altLang="en-US" dirty="0"/>
+              <a:t>：直接调用</a:t>
+            </a:r>
+            <a:r>
+              <a:rPr lang="en-US" altLang="zh-CN" dirty="0" err="1"/>
+              <a:t>SYS_clean_module</a:t>
+            </a:r>
+            <a:r>
+              <a:rPr lang="zh-CN" altLang="en-US" dirty="0"/>
+              <a:t> ，参数为文件名</a:t>
+            </a:r>
+            <a:endParaRPr lang="en-US" altLang="zh-CN" dirty="0"/>
+          </a:p>
+        </p:txBody>
+      </p:sp>
+    </p:spTree>
+    <p:extLst>
+      <p:ext uri="{BB962C8B-B14F-4D97-AF65-F5344CB8AC3E}">
+        <p14:creationId xmlns:p14="http://schemas.microsoft.com/office/powerpoint/2010/main" val="773762884"/>
+      </p:ext>
+    </p:extLst>
+  </p:cSld>
+  <p:clrMapOvr>
+    <a:masterClrMapping/>
+  </p:clrMapOvr>
+  <p:transition spd="med"/>
+</p:sld>
+</file>
+
+<file path=ppt/slides/slide11.xml><?xml version="1.0" encoding="utf-8"?>
+<p:sld xmlns:a="http://schemas.openxmlformats.org/drawingml/2006/main" xmlns:r="http://schemas.openxmlformats.org/officeDocument/2006/relationships" xmlns:p="http://schemas.openxmlformats.org/presentationml/2006/main">
+  <p:cSld>
+    <p:spTree>
+      <p:nvGrpSpPr>
+        <p:cNvPr id="1" name=""/>
+        <p:cNvGrpSpPr/>
+        <p:nvPr/>
+      </p:nvGrpSpPr>
+      <p:grpSpPr>
+        <a:xfrm>
+          <a:off x="0" y="0"/>
+          <a:ext cx="0" cy="0"/>
+          <a:chOff x="0" y="0"/>
+          <a:chExt cx="0" cy="0"/>
+        </a:xfrm>
+      </p:grpSpPr>
+      <p:sp>
+        <p:nvSpPr>
+          <p:cNvPr id="2" name="标题 1"/>
+          <p:cNvSpPr>
+            <a:spLocks noGrp="1"/>
+          </p:cNvSpPr>
+          <p:nvPr>
+            <p:ph type="title"/>
+          </p:nvPr>
+        </p:nvSpPr>
+        <p:spPr/>
+        <p:txBody>
+          <a:bodyPr/>
+          <a:lstStyle/>
+          <a:p>
+            <a:r>
+              <a:rPr kumimoji="1" lang="zh-CN" altLang="en-US" dirty="0" smtClean="0"/>
+              <a:t>实验结果</a:t>
+            </a:r>
+            <a:endParaRPr kumimoji="1" lang="zh-CN" altLang="en-US" dirty="0"/>
+          </a:p>
+        </p:txBody>
+      </p:sp>
+      <p:sp>
+        <p:nvSpPr>
+          <p:cNvPr id="3" name="文本占位符 2"/>
+          <p:cNvSpPr>
+            <a:spLocks noGrp="1"/>
+          </p:cNvSpPr>
+          <p:nvPr>
+            <p:ph type="body" idx="1"/>
+          </p:nvPr>
+        </p:nvSpPr>
+        <p:spPr/>
+        <p:txBody>
+          <a:bodyPr/>
+          <a:lstStyle/>
+          <a:p>
+            <a:endParaRPr kumimoji="1" lang="zh-CN" altLang="en-US"/>
+          </a:p>
+        </p:txBody>
+      </p:sp>
+      <p:pic>
+        <p:nvPicPr>
+          <p:cNvPr id="4" name="图片 3"/>
+          <p:cNvPicPr>
+            <a:picLocks noChangeAspect="1"/>
+          </p:cNvPicPr>
+          <p:nvPr/>
+        </p:nvPicPr>
+        <p:blipFill>
+          <a:blip r:embed="rId2"/>
+          <a:stretch>
+            <a:fillRect/>
+          </a:stretch>
+        </p:blipFill>
+        <p:spPr>
+          <a:xfrm>
+            <a:off x="3860800" y="2609238"/>
+            <a:ext cx="4470400" cy="2146300"/>
+          </a:xfrm>
+          <a:prstGeom prst="rect">
+            <a:avLst/>
+          </a:prstGeom>
+        </p:spPr>
+      </p:pic>
+    </p:spTree>
+    <p:extLst>
+      <p:ext uri="{BB962C8B-B14F-4D97-AF65-F5344CB8AC3E}">
+        <p14:creationId xmlns:p14="http://schemas.microsoft.com/office/powerpoint/2010/main" val="1382433147"/>
+      </p:ext>
+    </p:extLst>
+  </p:cSld>
+  <p:clrMapOvr>
+    <a:masterClrMapping/>
+  </p:clrMapOvr>
+  <p:transition spd="med"/>
+</p:sld>
+</file>
+
+<file path=ppt/slides/slide12.xml><?xml version="1.0" encoding="utf-8"?>
+<p:sld xmlns:a="http://schemas.openxmlformats.org/drawingml/2006/main" xmlns:r="http://schemas.openxmlformats.org/officeDocument/2006/relationships" xmlns:p="http://schemas.openxmlformats.org/presentationml/2006/main">
+  <p:cSld>
+    <p:spTree>
+      <p:nvGrpSpPr>
+        <p:cNvPr id="1" name=""/>
+        <p:cNvGrpSpPr/>
+        <p:nvPr/>
+      </p:nvGrpSpPr>
+      <p:grpSpPr>
+        <a:xfrm>
+          <a:off x="0" y="0"/>
+          <a:ext cx="0" cy="0"/>
+          <a:chOff x="0" y="0"/>
+          <a:chExt cx="0" cy="0"/>
+        </a:xfrm>
+      </p:grpSpPr>
+      <p:sp>
+        <p:nvSpPr>
+          <p:cNvPr id="2" name="标题 1"/>
+          <p:cNvSpPr>
+            <a:spLocks noGrp="1"/>
+          </p:cNvSpPr>
+          <p:nvPr>
+            <p:ph type="ctrTitle"/>
+          </p:nvPr>
+        </p:nvSpPr>
+        <p:spPr/>
+        <p:txBody>
+          <a:bodyPr/>
+          <a:lstStyle/>
+          <a:p>
+            <a:r>
+              <a:rPr kumimoji="1" lang="zh-CN" altLang="en-US" dirty="0" smtClean="0"/>
+              <a:t>谢谢大家！</a:t>
+            </a:r>
+            <a:endParaRPr kumimoji="1" lang="zh-CN" altLang="en-US" dirty="0"/>
+          </a:p>
+        </p:txBody>
+      </p:sp>
+      <p:sp>
+        <p:nvSpPr>
+          <p:cNvPr id="3" name="副标题 2"/>
+          <p:cNvSpPr>
+            <a:spLocks noGrp="1"/>
+          </p:cNvSpPr>
+          <p:nvPr>
+            <p:ph type="subTitle" idx="1"/>
+          </p:nvPr>
+        </p:nvSpPr>
+        <p:spPr/>
+        <p:txBody>
+          <a:bodyPr/>
+          <a:lstStyle/>
+          <a:p>
+            <a:endParaRPr kumimoji="1" lang="zh-CN" altLang="en-US"/>
+          </a:p>
+        </p:txBody>
+      </p:sp>
+    </p:spTree>
+    <p:extLst>
+      <p:ext uri="{BB962C8B-B14F-4D97-AF65-F5344CB8AC3E}">
+        <p14:creationId xmlns:p14="http://schemas.microsoft.com/office/powerpoint/2010/main" val="53633095"/>
       </p:ext>
     </p:extLst>
   </p:cSld>
@@ -3627,8 +4045,8 @@
           <a:lstStyle/>
           <a:p>
             <a:r>
-              <a:rPr dirty="0" err="1"/>
-              <a:t>课程设计目标</a:t>
+              <a:rPr lang="zh-CN" altLang="en-US" dirty="0" smtClean="0"/>
+              <a:t>工作概述</a:t>
             </a:r>
             <a:endParaRPr dirty="0"/>
           </a:p>
@@ -3651,7 +4069,7 @@
         </p:spPr>
         <p:txBody>
           <a:bodyPr>
-            <a:normAutofit lnSpcReduction="10000"/>
+            <a:normAutofit fontScale="85000" lnSpcReduction="20000"/>
           </a:bodyPr>
           <a:lstStyle/>
           <a:p>
@@ -3662,85 +4080,133 @@
               <a:defRPr sz="2944"/>
             </a:pPr>
             <a:r>
-              <a:rPr lang="zh-CN" altLang="en-US" dirty="0"/>
-              <a:t>基于</a:t>
-            </a:r>
-            <a:r>
-              <a:rPr lang="en-US" altLang="zh-CN" dirty="0"/>
-              <a:t>g11</a:t>
-            </a:r>
-            <a:r>
-              <a:rPr lang="zh-CN" altLang="en-US" dirty="0"/>
-              <a:t>组的代码，</a:t>
-            </a:r>
-            <a:r>
-              <a:rPr dirty="0"/>
-              <a:t>在 64 位 </a:t>
-            </a:r>
-            <a:r>
-              <a:rPr dirty="0" err="1"/>
-              <a:t>ucore</a:t>
-            </a:r>
-            <a:r>
-              <a:rPr dirty="0"/>
+              <a:rPr lang="en-US" altLang="zh-CN" dirty="0" smtClean="0"/>
+              <a:t>Rust</a:t>
+            </a:r>
+            <a:r>
+              <a:rPr lang="zh-CN" altLang="en-US" dirty="0" smtClean="0"/>
               <a:t> </a:t>
             </a:r>
             <a:r>
-              <a:rPr dirty="0" err="1"/>
-              <a:t>上实现可加载内核模块（LKM</a:t>
-            </a:r>
-            <a:r>
-              <a:rPr lang="zh-CN" altLang="en-US" dirty="0"/>
-              <a:t>）</a:t>
-            </a:r>
-            <a:endParaRPr lang="en-US" altLang="zh-CN" dirty="0"/>
-          </a:p>
-          <a:p>
-            <a:pPr marL="271899" indent="-271899" defTabSz="357353">
+              <a:rPr lang="en-US" altLang="zh-CN" dirty="0" smtClean="0"/>
+              <a:t>OS</a:t>
+            </a:r>
+            <a:r>
+              <a:rPr lang="zh-CN" altLang="en-US" dirty="0" smtClean="0"/>
+              <a:t> 中实现 </a:t>
+            </a:r>
+            <a:r>
+              <a:rPr lang="en-US" altLang="zh-CN" dirty="0" smtClean="0"/>
+              <a:t>LKM</a:t>
+            </a:r>
+            <a:endParaRPr lang="zh-CN" altLang="en-US" dirty="0" smtClean="0"/>
+          </a:p>
+          <a:p>
+            <a:pPr marL="287526" indent="-287526" defTabSz="377890">
               <a:spcBef>
-                <a:spcPts val="2531"/>
+                <a:spcPts val="2672"/>
               </a:spcBef>
-              <a:defRPr sz="2784"/>
+              <a:defRPr sz="2944"/>
             </a:pPr>
             <a:r>
-              <a:rPr lang="zh-CN" altLang="en-US" dirty="0"/>
-              <a:t>背景：系统的一部分功能的代码不载入到内存中，只保留接口。需要使用时将对应代码载入到内存中并修改系统对应指针，完成模块加载</a:t>
-            </a:r>
-          </a:p>
-          <a:p>
-            <a:pPr marL="271899" indent="-271899" defTabSz="357353">
+              <a:rPr lang="en-US" altLang="zh-CN" dirty="0" err="1" smtClean="0"/>
+              <a:t>Insmod</a:t>
+            </a:r>
+            <a:r>
+              <a:rPr lang="en-US" altLang="zh-CN" dirty="0" smtClean="0"/>
+              <a:t>, </a:t>
+            </a:r>
+            <a:r>
+              <a:rPr lang="en-US" altLang="zh-CN" dirty="0" err="1" smtClean="0"/>
+              <a:t>rmmod</a:t>
+            </a:r>
+            <a:r>
+              <a:rPr lang="zh-CN" altLang="en-US" dirty="0" smtClean="0"/>
+              <a:t>，</a:t>
+            </a:r>
+            <a:r>
+              <a:rPr lang="en-US" altLang="zh-CN" dirty="0" err="1" smtClean="0"/>
+              <a:t>lsmod</a:t>
+            </a:r>
+            <a:r>
+              <a:rPr lang="zh-CN" altLang="en-US" dirty="0" smtClean="0"/>
+              <a:t> 用户程序</a:t>
+            </a:r>
+          </a:p>
+          <a:p>
+            <a:pPr marL="287526" indent="-287526" defTabSz="377890">
               <a:spcBef>
-                <a:spcPts val="2531"/>
+                <a:spcPts val="2672"/>
               </a:spcBef>
-              <a:defRPr sz="2784"/>
+              <a:defRPr sz="2944"/>
             </a:pPr>
             <a:r>
-              <a:rPr lang="zh-CN" altLang="en-US" dirty="0"/>
-              <a:t>优点：</a:t>
-            </a:r>
-          </a:p>
-          <a:p>
-            <a:pPr marL="543799" lvl="1" indent="-271899" defTabSz="357353">
+              <a:rPr lang="zh-CN" altLang="en-US" dirty="0" smtClean="0"/>
+              <a:t>基于 </a:t>
+            </a:r>
+            <a:r>
+              <a:rPr lang="en-US" altLang="zh-CN" dirty="0" smtClean="0"/>
+              <a:t>Rust</a:t>
+            </a:r>
+            <a:r>
+              <a:rPr lang="zh-CN" altLang="en-US" dirty="0" smtClean="0"/>
+              <a:t> 的内核模块</a:t>
+            </a:r>
+          </a:p>
+          <a:p>
+            <a:pPr marL="287526" indent="-287526" defTabSz="377890">
               <a:spcBef>
-                <a:spcPts val="2531"/>
+                <a:spcPts val="2672"/>
               </a:spcBef>
-              <a:defRPr sz="2784"/>
+              <a:defRPr sz="2944"/>
             </a:pPr>
             <a:r>
-              <a:rPr lang="zh-CN" altLang="en-US" dirty="0"/>
-              <a:t>可以动态调整接口对应代码，更加灵活</a:t>
-            </a:r>
-          </a:p>
-          <a:p>
-            <a:pPr marL="543799" lvl="1" indent="-271899" defTabSz="357353">
+              <a:rPr lang="zh-CN" altLang="en-US" dirty="0" smtClean="0"/>
+              <a:t>能够加载，卸载内核模块</a:t>
+            </a:r>
+          </a:p>
+          <a:p>
+            <a:pPr marL="287526" indent="-287526" defTabSz="377890">
               <a:spcBef>
-                <a:spcPts val="2531"/>
+                <a:spcPts val="2672"/>
               </a:spcBef>
-              <a:defRPr sz="2784"/>
+              <a:defRPr sz="2944"/>
             </a:pPr>
             <a:r>
-              <a:rPr lang="zh-CN" altLang="en-US" dirty="0"/>
-              <a:t>减小内核占用内存空间</a:t>
+              <a:rPr lang="zh-CN" altLang="en-US" dirty="0" smtClean="0"/>
+              <a:t>模块中能够正确调用内核符号</a:t>
+            </a:r>
+          </a:p>
+          <a:p>
+            <a:pPr marL="287526" indent="-287526" defTabSz="377890">
+              <a:spcBef>
+                <a:spcPts val="2672"/>
+              </a:spcBef>
+              <a:defRPr sz="2944"/>
+            </a:pPr>
+            <a:r>
+              <a:rPr lang="zh-CN" altLang="en-US" dirty="0" smtClean="0"/>
+              <a:t>但是在模块中 </a:t>
+            </a:r>
+            <a:r>
+              <a:rPr lang="en-US" altLang="zh-CN" dirty="0" smtClean="0"/>
+              <a:t>register</a:t>
+            </a:r>
+            <a:r>
+              <a:rPr lang="zh-CN" altLang="en-US" dirty="0" smtClean="0"/>
+              <a:t> 一个函数的时候得不到正确的函数地址</a:t>
+            </a:r>
+          </a:p>
+          <a:p>
+            <a:pPr marL="287526" indent="-287526" defTabSz="377890">
+              <a:spcBef>
+                <a:spcPts val="2672"/>
+              </a:spcBef>
+              <a:defRPr sz="2944"/>
+            </a:pPr>
+            <a:r>
+              <a:rPr lang="zh-CN" altLang="en-US" dirty="0" smtClean="0"/>
+              <a:t>我们目前只能使用在加载内核模块时将模块中的函数一并导出的方法调用内核模块中的符号</a:t>
             </a:r>
             <a:endParaRPr dirty="0"/>
           </a:p>
@@ -3766,7 +4232,7 @@
           </a:prstGeom>
           <a:extLst>
             <a:ext uri="{C572A759-6A51-4108-AA02-DFA0A04FC94B}">
-              <ma14:wrappingTextBoxFlag xmlns="" xmlns:ma14="http://schemas.microsoft.com/office/mac/drawingml/2011/main" val="1"/>
+              <ma14:wrappingTextBoxFlag xmlns:ma14="http://schemas.microsoft.com/office/mac/drawingml/2011/main" val="1"/>
             </a:ext>
           </a:extLst>
         </p:spPr>
@@ -3817,7 +4283,7 @@
           <p:cNvPr id="2" name="标题 1">
             <a:extLst>
               <a:ext uri="{FF2B5EF4-FFF2-40B4-BE49-F238E27FC236}">
-                <a16:creationId xmlns:a16="http://schemas.microsoft.com/office/drawing/2014/main" id="{1DBC8754-9271-484E-8547-A1B5DB40E532}"/>
+                <a16:creationId xmlns:a16="http://schemas.microsoft.com/office/drawing/2014/main" xmlns="" id="{1DBC8754-9271-484E-8547-A1B5DB40E532}"/>
               </a:ext>
             </a:extLst>
           </p:cNvPr>
@@ -3845,7 +4311,7 @@
           <p:cNvPr id="3" name="文本占位符 2">
             <a:extLst>
               <a:ext uri="{FF2B5EF4-FFF2-40B4-BE49-F238E27FC236}">
-                <a16:creationId xmlns:a16="http://schemas.microsoft.com/office/drawing/2014/main" id="{1E043A84-A875-4A73-94CC-B215C8C82304}"/>
+                <a16:creationId xmlns:a16="http://schemas.microsoft.com/office/drawing/2014/main" xmlns="" id="{1E043A84-A875-4A73-94CC-B215C8C82304}"/>
               </a:ext>
             </a:extLst>
           </p:cNvPr>
@@ -3858,12 +4324,49 @@
         </p:nvSpPr>
         <p:spPr/>
         <p:txBody>
-          <a:bodyPr/>
-          <a:lstStyle/>
-          <a:p>
+          <a:bodyPr>
+            <a:normAutofit lnSpcReduction="10000"/>
+          </a:bodyPr>
+          <a:lstStyle/>
+          <a:p>
+            <a:r>
+              <a:rPr kumimoji="1" lang="zh-CN" altLang="en-US" dirty="0"/>
+              <a:t>有关变量的</a:t>
+            </a:r>
+            <a:r>
+              <a:rPr kumimoji="1" lang="zh-CN" altLang="en-US" dirty="0" smtClean="0"/>
+              <a:t>初始化</a:t>
+            </a:r>
+            <a:endParaRPr lang="zh-CN" altLang="en-US" dirty="0" smtClean="0"/>
+          </a:p>
+          <a:p>
+            <a:r>
+              <a:rPr lang="zh-CN" altLang="en-US" dirty="0" smtClean="0"/>
+              <a:t>建立</a:t>
+            </a:r>
             <a:r>
               <a:rPr lang="zh-CN" altLang="en-US" dirty="0"/>
-              <a:t>建立内核符号表，支持以下操作</a:t>
+              <a:t>内核符号表</a:t>
+            </a:r>
+            <a:r>
+              <a:rPr lang="zh-CN" altLang="en-US" dirty="0" smtClean="0"/>
+              <a:t>，</a:t>
+            </a:r>
+            <a:r>
+              <a:rPr kumimoji="1" lang="zh-CN" altLang="en-US" dirty="0"/>
+              <a:t>记录内核符号以及对应的入口</a:t>
+            </a:r>
+            <a:r>
+              <a:rPr kumimoji="1" lang="zh-CN" altLang="en-US" dirty="0" smtClean="0"/>
+              <a:t>地址</a:t>
+            </a:r>
+            <a:r>
+              <a:rPr lang="zh-CN" altLang="en-US" dirty="0" smtClean="0"/>
+              <a:t>，支持</a:t>
+            </a:r>
+            <a:r>
+              <a:rPr lang="zh-CN" altLang="en-US" dirty="0"/>
+              <a:t>以下操作</a:t>
             </a:r>
             <a:endParaRPr lang="en-US" altLang="zh-CN" dirty="0"/>
           </a:p>
@@ -3946,8 +4449,35 @@
           <a:p>
             <a:r>
               <a:rPr lang="zh-CN" altLang="en-US" dirty="0"/>
-              <a:t>将系统内核符号导出到内核符号表中，以便模块调用系统符号</a:t>
-            </a:r>
+              <a:t>将系统内核符号导出到内核符号表中，以便模块调用系统</a:t>
+            </a:r>
+            <a:r>
+              <a:rPr lang="zh-CN" altLang="en-US" dirty="0" smtClean="0"/>
+              <a:t>符号</a:t>
+            </a:r>
+          </a:p>
+          <a:p>
+            <a:r>
+              <a:rPr kumimoji="1" lang="zh-CN" altLang="en-US" dirty="0" smtClean="0"/>
+              <a:t>使用</a:t>
+            </a:r>
+            <a:r>
+              <a:rPr kumimoji="1" lang="zh-CN" altLang="en-US" dirty="0"/>
+              <a:t>哈希表（伪</a:t>
+            </a:r>
+            <a:r>
+              <a:rPr kumimoji="1" lang="zh-CN" altLang="en-US" dirty="0" smtClean="0"/>
+              <a:t>）在</a:t>
+            </a:r>
+            <a:r>
+              <a:rPr kumimoji="1" lang="zh-CN" altLang="en-US" dirty="0"/>
+              <a:t>重定位时从哈希表中查找相应的符号地址并</a:t>
+            </a:r>
+            <a:r>
+              <a:rPr kumimoji="1" lang="zh-CN" altLang="en-US" dirty="0" smtClean="0"/>
+              <a:t>填入</a:t>
+            </a:r>
+            <a:endParaRPr kumimoji="1" lang="zh-CN" altLang="en-US" dirty="0"/>
           </a:p>
         </p:txBody>
       </p:sp>
@@ -3987,7 +4517,7 @@
           <p:cNvPr id="2" name="标题 1">
             <a:extLst>
               <a:ext uri="{FF2B5EF4-FFF2-40B4-BE49-F238E27FC236}">
-                <a16:creationId xmlns:a16="http://schemas.microsoft.com/office/drawing/2014/main" id="{F4365FE6-D60A-461B-AC6D-783E2F5F884A}"/>
+                <a16:creationId xmlns:a16="http://schemas.microsoft.com/office/drawing/2014/main" xmlns="" id="{F4365FE6-D60A-461B-AC6D-783E2F5F884A}"/>
               </a:ext>
             </a:extLst>
           </p:cNvPr>
@@ -4015,7 +4545,7 @@
           <p:cNvPr id="3" name="文本占位符 2">
             <a:extLst>
               <a:ext uri="{FF2B5EF4-FFF2-40B4-BE49-F238E27FC236}">
-                <a16:creationId xmlns:a16="http://schemas.microsoft.com/office/drawing/2014/main" id="{729B2211-8C4E-443F-85BF-0B4603873A68}"/>
+                <a16:creationId xmlns:a16="http://schemas.microsoft.com/office/drawing/2014/main" xmlns="" id="{729B2211-8C4E-443F-85BF-0B4603873A68}"/>
               </a:ext>
             </a:extLst>
           </p:cNvPr>
@@ -4088,9 +4618,20 @@
               <a:t>module</a:t>
             </a:r>
             <a:r>
-              <a:rPr lang="zh-CN" altLang="en-US" dirty="0"/>
+              <a:rPr lang="zh-CN" altLang="en-US" dirty="0" smtClean="0"/>
               <a:t>名称</a:t>
             </a:r>
+          </a:p>
+          <a:p>
+            <a:r>
+              <a:rPr lang="en-US" altLang="zh-CN" dirty="0" err="1" smtClean="0"/>
+              <a:t>SYS_mod_add</a:t>
+            </a:r>
+            <a:r>
+              <a:rPr lang="zh-CN" altLang="en-US" dirty="0" smtClean="0"/>
+              <a:t>：调用内核模块中加法函数</a:t>
+            </a:r>
+            <a:endParaRPr lang="zh-CN" altLang="en-US" dirty="0"/>
           </a:p>
         </p:txBody>
       </p:sp>
@@ -4130,7 +4671,7 @@
           <p:cNvPr id="2" name="标题 1">
             <a:extLst>
               <a:ext uri="{FF2B5EF4-FFF2-40B4-BE49-F238E27FC236}">
-                <a16:creationId xmlns:a16="http://schemas.microsoft.com/office/drawing/2014/main" id="{E17F0309-6847-4404-9C6E-74AB4ABBD4F8}"/>
+                <a16:creationId xmlns:a16="http://schemas.microsoft.com/office/drawing/2014/main" xmlns="" id="{E17F0309-6847-4404-9C6E-74AB4ABBD4F8}"/>
               </a:ext>
             </a:extLst>
           </p:cNvPr>
@@ -4159,7 +4700,7 @@
           <p:cNvPr id="3" name="文本占位符 2">
             <a:extLst>
               <a:ext uri="{FF2B5EF4-FFF2-40B4-BE49-F238E27FC236}">
-                <a16:creationId xmlns:a16="http://schemas.microsoft.com/office/drawing/2014/main" id="{A81D5511-71D4-4705-899A-2AF6642BFB72}"/>
+                <a16:creationId xmlns:a16="http://schemas.microsoft.com/office/drawing/2014/main" xmlns="" id="{A81D5511-71D4-4705-899A-2AF6642BFB72}"/>
               </a:ext>
             </a:extLst>
           </p:cNvPr>
@@ -4267,13 +4808,7 @@
       </p:grpSpPr>
       <p:sp>
         <p:nvSpPr>
-          <p:cNvPr id="2" name="标题 1">
-            <a:extLst>
-              <a:ext uri="{FF2B5EF4-FFF2-40B4-BE49-F238E27FC236}">
-                <a16:creationId xmlns:a16="http://schemas.microsoft.com/office/drawing/2014/main" id="{599EABFF-600C-4EED-BD9C-4D58B2E00228}"/>
-              </a:ext>
-            </a:extLst>
-          </p:cNvPr>
+          <p:cNvPr id="2" name="标题 1"/>
           <p:cNvSpPr>
             <a:spLocks noGrp="1"/>
           </p:cNvSpPr>
@@ -4287,22 +4822,16 @@
           <a:lstStyle/>
           <a:p>
             <a:r>
-              <a:rPr lang="en-US" altLang="zh-CN" dirty="0" err="1"/>
-              <a:t>SYS_cleanup_module</a:t>
-            </a:r>
-            <a:endParaRPr lang="zh-CN" altLang="en-US" dirty="0"/>
-          </a:p>
-        </p:txBody>
-      </p:sp>
-      <p:sp>
-        <p:nvSpPr>
-          <p:cNvPr id="3" name="文本占位符 2">
-            <a:extLst>
-              <a:ext uri="{FF2B5EF4-FFF2-40B4-BE49-F238E27FC236}">
-                <a16:creationId xmlns:a16="http://schemas.microsoft.com/office/drawing/2014/main" id="{6822B7F5-650E-404F-88B2-6B1C4AD1EDEA}"/>
-              </a:ext>
-            </a:extLst>
-          </p:cNvPr>
+              <a:rPr kumimoji="1" lang="zh-CN" altLang="en-US" dirty="0" smtClean="0"/>
+              <a:t>加载内核模块</a:t>
+            </a:r>
+            <a:endParaRPr kumimoji="1" lang="zh-CN" altLang="en-US" dirty="0"/>
+          </a:p>
+        </p:txBody>
+      </p:sp>
+      <p:sp>
+        <p:nvSpPr>
+          <p:cNvPr id="3" name="文本占位符 2"/>
           <p:cNvSpPr>
             <a:spLocks noGrp="1"/>
           </p:cNvSpPr>
@@ -4316,27 +4845,105 @@
           <a:lstStyle/>
           <a:p>
             <a:r>
-              <a:rPr lang="zh-CN" altLang="en-US" dirty="0"/>
-              <a:t>将根据</a:t>
-            </a:r>
-            <a:r>
-              <a:rPr lang="en-US" altLang="zh-CN" dirty="0"/>
-              <a:t>module</a:t>
-            </a:r>
-            <a:r>
-              <a:rPr lang="zh-CN" altLang="en-US" dirty="0"/>
-              <a:t>名字将其移出符号表</a:t>
-            </a:r>
-          </a:p>
-          <a:p>
-            <a:endParaRPr lang="zh-CN" altLang="en-US" dirty="0"/>
+              <a:rPr kumimoji="1" lang="zh-CN" altLang="en-US" dirty="0" smtClean="0"/>
+              <a:t>读取内核模块并解析 </a:t>
+            </a:r>
+            <a:r>
+              <a:rPr kumimoji="1" lang="en-US" altLang="zh-CN" dirty="0" smtClean="0"/>
+              <a:t>elf</a:t>
+            </a:r>
+            <a:r>
+              <a:rPr kumimoji="1" lang="zh-CN" altLang="en-US" dirty="0" smtClean="0"/>
+              <a:t> 头文件</a:t>
+            </a:r>
+            <a:endParaRPr kumimoji="1" lang="en-US" altLang="zh-CN" dirty="0"/>
+          </a:p>
+          <a:p>
+            <a:r>
+              <a:rPr kumimoji="1" lang="en-US" altLang="zh-CN" dirty="0" smtClean="0"/>
+              <a:t>Sanity check</a:t>
+            </a:r>
+            <a:endParaRPr kumimoji="1" lang="zh-CN" altLang="en-US" dirty="0" smtClean="0"/>
+          </a:p>
+          <a:p>
+            <a:pPr lvl="1"/>
+            <a:r>
+              <a:rPr kumimoji="1" lang="zh-CN" altLang="en-US" dirty="0" smtClean="0"/>
+              <a:t>检查 </a:t>
+            </a:r>
+            <a:r>
+              <a:rPr kumimoji="1" lang="en-US" altLang="zh-CN" dirty="0" smtClean="0"/>
+              <a:t>magic</a:t>
+            </a:r>
+            <a:r>
+              <a:rPr kumimoji="1" lang="zh-CN" altLang="en-US" dirty="0" smtClean="0"/>
+              <a:t>，</a:t>
+            </a:r>
+            <a:r>
+              <a:rPr kumimoji="1" lang="en-US" altLang="zh-CN" dirty="0" smtClean="0"/>
+              <a:t>type</a:t>
+            </a:r>
+            <a:r>
+              <a:rPr kumimoji="1" lang="zh-CN" altLang="en-US" dirty="0" smtClean="0"/>
+              <a:t>，</a:t>
+            </a:r>
+            <a:r>
+              <a:rPr kumimoji="1" lang="en-US" altLang="zh-CN" dirty="0" smtClean="0"/>
+              <a:t>machine</a:t>
+            </a:r>
+            <a:r>
+              <a:rPr kumimoji="1" lang="zh-CN" altLang="en-US" dirty="0" smtClean="0"/>
+              <a:t>等字段</a:t>
+            </a:r>
+          </a:p>
+          <a:p>
+            <a:pPr lvl="1"/>
+            <a:r>
+              <a:rPr kumimoji="1" lang="zh-CN" altLang="en-US" dirty="0" smtClean="0"/>
+              <a:t>在读每个 </a:t>
+            </a:r>
+            <a:r>
+              <a:rPr kumimoji="1" lang="en-US" altLang="zh-CN" dirty="0" smtClean="0"/>
+              <a:t>section</a:t>
+            </a:r>
+            <a:r>
+              <a:rPr kumimoji="1" lang="zh-CN" altLang="en-US" dirty="0"/>
+              <a:t> </a:t>
+            </a:r>
+            <a:r>
+              <a:rPr kumimoji="1" lang="zh-CN" altLang="en-US" dirty="0" smtClean="0"/>
+              <a:t>的时候也要检查每个 </a:t>
+            </a:r>
+            <a:r>
+              <a:rPr kumimoji="1" lang="en-US" altLang="zh-CN" dirty="0" smtClean="0"/>
+              <a:t>section</a:t>
+            </a:r>
+            <a:r>
+              <a:rPr kumimoji="1" lang="zh-CN" altLang="en-US" dirty="0" smtClean="0"/>
+              <a:t> 长度是否有效</a:t>
+            </a:r>
+          </a:p>
+          <a:p>
+            <a:r>
+              <a:rPr kumimoji="1" lang="zh-CN" altLang="en-US" dirty="0" smtClean="0"/>
+              <a:t>解析 </a:t>
+            </a:r>
+            <a:r>
+              <a:rPr kumimoji="1" lang="en-US" altLang="zh-CN" dirty="0" smtClean="0"/>
+              <a:t>elf</a:t>
+            </a:r>
+            <a:r>
+              <a:rPr kumimoji="1" lang="zh-CN" altLang="en-US" dirty="0" smtClean="0"/>
+              <a:t> 头，进行重定位操作（重点）</a:t>
+            </a:r>
+            <a:endParaRPr kumimoji="1" lang="zh-CN" altLang="en-US" dirty="0"/>
           </a:p>
         </p:txBody>
       </p:sp>
     </p:spTree>
     <p:extLst>
       <p:ext uri="{BB962C8B-B14F-4D97-AF65-F5344CB8AC3E}">
-        <p14:creationId xmlns:p14="http://schemas.microsoft.com/office/powerpoint/2010/main" val="603591776"/>
+        <p14:creationId xmlns:p14="http://schemas.microsoft.com/office/powerpoint/2010/main" val="1089345581"/>
       </p:ext>
     </p:extLst>
   </p:cSld>
@@ -4366,13 +4973,7 @@
       </p:grpSpPr>
       <p:sp>
         <p:nvSpPr>
-          <p:cNvPr id="2" name="标题 1">
-            <a:extLst>
-              <a:ext uri="{FF2B5EF4-FFF2-40B4-BE49-F238E27FC236}">
-                <a16:creationId xmlns:a16="http://schemas.microsoft.com/office/drawing/2014/main" id="{544BA2BB-8171-4768-806B-1215B8F01099}"/>
-              </a:ext>
-            </a:extLst>
-          </p:cNvPr>
+          <p:cNvPr id="2" name="标题 1"/>
           <p:cNvSpPr>
             <a:spLocks noGrp="1"/>
           </p:cNvSpPr>
@@ -4386,21 +4987,24 @@
           <a:lstStyle/>
           <a:p>
             <a:r>
-              <a:rPr lang="zh-CN" altLang="en-US" dirty="0"/>
-              <a:t>用户态的相关工具</a:t>
-            </a:r>
-          </a:p>
-        </p:txBody>
-      </p:sp>
-      <p:sp>
-        <p:nvSpPr>
-          <p:cNvPr id="3" name="文本占位符 2">
-            <a:extLst>
-              <a:ext uri="{FF2B5EF4-FFF2-40B4-BE49-F238E27FC236}">
-                <a16:creationId xmlns:a16="http://schemas.microsoft.com/office/drawing/2014/main" id="{7F621652-1B47-45C5-BB2E-97F9520D27A0}"/>
-              </a:ext>
-            </a:extLst>
-          </p:cNvPr>
+              <a:rPr kumimoji="1" lang="zh-CN" altLang="en-US" dirty="0" smtClean="0"/>
+              <a:t>解析 </a:t>
+            </a:r>
+            <a:r>
+              <a:rPr kumimoji="1" lang="en-US" altLang="zh-CN" dirty="0" smtClean="0"/>
+              <a:t>elf</a:t>
+            </a:r>
+            <a:r>
+              <a:rPr kumimoji="1" lang="zh-CN" altLang="en-US" dirty="0" smtClean="0"/>
+              <a:t> 头</a:t>
+            </a:r>
+            <a:endParaRPr kumimoji="1" lang="zh-CN" altLang="en-US" dirty="0"/>
+          </a:p>
+        </p:txBody>
+      </p:sp>
+      <p:sp>
+        <p:nvSpPr>
+          <p:cNvPr id="3" name="文本占位符 2"/>
           <p:cNvSpPr>
             <a:spLocks noGrp="1"/>
           </p:cNvSpPr>
@@ -4414,168 +5018,402 @@
           <a:lstStyle/>
           <a:p>
             <a:r>
-              <a:rPr lang="en-US" altLang="zh-CN" dirty="0" err="1"/>
-              <a:t>insmod</a:t>
-            </a:r>
-            <a:r>
-              <a:rPr lang="zh-CN" altLang="en-US" dirty="0"/>
-              <a:t>：用户态的</a:t>
-            </a:r>
-            <a:r>
-              <a:rPr lang="en-US" altLang="zh-CN" dirty="0"/>
-              <a:t>LKM</a:t>
-            </a:r>
-            <a:r>
-              <a:rPr lang="zh-CN" altLang="en-US" dirty="0"/>
-              <a:t>加载工具</a:t>
-            </a:r>
-            <a:endParaRPr lang="en-US" altLang="zh-CN" dirty="0"/>
+              <a:rPr kumimoji="1" lang="zh-CN" altLang="en-US" dirty="0" smtClean="0"/>
+              <a:t>遍历 </a:t>
+            </a:r>
+            <a:r>
+              <a:rPr kumimoji="1" lang="en-US" altLang="zh-CN" dirty="0" smtClean="0"/>
+              <a:t>section</a:t>
+            </a:r>
+            <a:endParaRPr kumimoji="1" lang="zh-CN" altLang="en-US" dirty="0" smtClean="0"/>
+          </a:p>
+          <a:p>
+            <a:r>
+              <a:rPr kumimoji="1" lang="zh-CN" altLang="en-US" dirty="0" smtClean="0"/>
+              <a:t>找到符号表 </a:t>
+            </a:r>
+            <a:r>
+              <a:rPr kumimoji="1" lang="en-US" altLang="zh-CN" dirty="0" err="1" smtClean="0"/>
+              <a:t>symtab</a:t>
+            </a:r>
+            <a:endParaRPr kumimoji="1" lang="zh-CN" altLang="en-US" dirty="0" smtClean="0"/>
           </a:p>
           <a:p>
             <a:pPr lvl="1"/>
             <a:r>
-              <a:rPr lang="zh-CN" altLang="en-US" dirty="0"/>
-              <a:t>检查</a:t>
-            </a:r>
-            <a:r>
-              <a:rPr lang="en-US" altLang="zh-CN" dirty="0"/>
-              <a:t>dependency</a:t>
-            </a:r>
-            <a:r>
-              <a:rPr lang="zh-CN" altLang="en-US" dirty="0"/>
-              <a:t>：</a:t>
-            </a:r>
-            <a:r>
-              <a:rPr lang="en-US" altLang="zh-CN" dirty="0"/>
-              <a:t> dependency</a:t>
-            </a:r>
-            <a:r>
-              <a:rPr lang="zh-CN" altLang="en-US" dirty="0"/>
-              <a:t>在文本文件</a:t>
-            </a:r>
-            <a:r>
-              <a:rPr lang="en-US" altLang="zh-CN" dirty="0" err="1"/>
-              <a:t>mod.dep</a:t>
-            </a:r>
-            <a:r>
-              <a:rPr lang="zh-CN" altLang="en-US" dirty="0"/>
-              <a:t>定义，每行表示一项规则。“</a:t>
-            </a:r>
-            <a:r>
-              <a:rPr lang="en-US" altLang="zh-CN" dirty="0"/>
-              <a:t>mod: m1 m2 …</a:t>
-            </a:r>
-            <a:r>
-              <a:rPr lang="zh-CN" altLang="en-US" dirty="0"/>
-              <a:t>”表示</a:t>
-            </a:r>
-            <a:r>
-              <a:rPr lang="en-US" altLang="zh-CN" dirty="0"/>
-              <a:t>mod</a:t>
-            </a:r>
-            <a:r>
-              <a:rPr lang="zh-CN" altLang="en-US" dirty="0"/>
-              <a:t>依赖</a:t>
-            </a:r>
-            <a:r>
-              <a:rPr lang="en-US" altLang="zh-CN" dirty="0"/>
-              <a:t>m1</a:t>
-            </a:r>
-            <a:r>
-              <a:rPr lang="zh-CN" altLang="en-US" dirty="0"/>
-              <a:t>、</a:t>
-            </a:r>
-            <a:r>
-              <a:rPr lang="en-US" altLang="zh-CN" dirty="0"/>
-              <a:t>m2</a:t>
-            </a:r>
-            <a:r>
-              <a:rPr lang="zh-CN" altLang="en-US" dirty="0"/>
-              <a:t>、</a:t>
-            </a:r>
-            <a:r>
-              <a:rPr lang="en-US" altLang="zh-CN" dirty="0"/>
-              <a:t>…</a:t>
-            </a:r>
-            <a:r>
-              <a:rPr lang="zh-CN" altLang="en-US" dirty="0"/>
-              <a:t>，</a:t>
-            </a:r>
-            <a:r>
-              <a:rPr lang="en-US" altLang="zh-CN" dirty="0"/>
-              <a:t>m1</a:t>
-            </a:r>
-            <a:r>
-              <a:rPr lang="zh-CN" altLang="en-US" dirty="0"/>
-              <a:t>、</a:t>
-            </a:r>
-            <a:r>
-              <a:rPr lang="en-US" altLang="zh-CN" dirty="0"/>
-              <a:t>m2</a:t>
-            </a:r>
-            <a:r>
-              <a:rPr lang="zh-CN" altLang="en-US" dirty="0"/>
-              <a:t>、</a:t>
-            </a:r>
-            <a:r>
-              <a:rPr lang="en-US" altLang="zh-CN" dirty="0"/>
-              <a:t>…</a:t>
-            </a:r>
-            <a:r>
-              <a:rPr lang="zh-CN" altLang="en-US" dirty="0"/>
-              <a:t>需要按照依赖关系拓扑排序</a:t>
-            </a:r>
-            <a:endParaRPr lang="en-US" altLang="zh-CN" dirty="0"/>
+              <a:rPr kumimoji="1" lang="zh-CN" altLang="en-US" dirty="0" smtClean="0"/>
+              <a:t>如果是 </a:t>
+            </a:r>
+            <a:r>
+              <a:rPr kumimoji="1" lang="en-US" altLang="zh-CN" dirty="0" err="1" smtClean="0"/>
+              <a:t>init_module</a:t>
+            </a:r>
+            <a:r>
+              <a:rPr kumimoji="1" lang="en-US" altLang="zh-CN" dirty="0" smtClean="0"/>
+              <a:t> </a:t>
+            </a:r>
+            <a:r>
+              <a:rPr kumimoji="1" lang="zh-CN" altLang="en-US" dirty="0" smtClean="0"/>
+              <a:t>和 </a:t>
+            </a:r>
+            <a:r>
+              <a:rPr kumimoji="1" lang="en-US" altLang="zh-CN" dirty="0" err="1" smtClean="0"/>
+              <a:t>cleanup_module</a:t>
+            </a:r>
+            <a:r>
+              <a:rPr kumimoji="1" lang="zh-CN" altLang="en-US" dirty="0" smtClean="0"/>
+              <a:t>，则记录地址</a:t>
+            </a:r>
           </a:p>
           <a:p>
             <a:pPr lvl="1"/>
             <a:r>
-              <a:rPr lang="zh-CN" altLang="en-US" dirty="0"/>
-              <a:t>加载</a:t>
-            </a:r>
-            <a:r>
-              <a:rPr lang="en-US" altLang="zh-CN" dirty="0"/>
-              <a:t>module</a:t>
-            </a:r>
-            <a:r>
-              <a:rPr lang="zh-CN" altLang="en-US" dirty="0"/>
-              <a:t>：调用</a:t>
-            </a:r>
-            <a:r>
-              <a:rPr lang="en-US" altLang="zh-CN" dirty="0" err="1"/>
-              <a:t>SYS_init_module</a:t>
-            </a:r>
-            <a:r>
-              <a:rPr lang="zh-CN" altLang="en-US" dirty="0"/>
-              <a:t>，参数为文件名</a:t>
-            </a:r>
-            <a:endParaRPr lang="en-US" altLang="zh-CN" dirty="0"/>
-          </a:p>
-          <a:p>
-            <a:r>
-              <a:rPr lang="en-US" altLang="zh-CN" dirty="0" err="1"/>
-              <a:t>rmmod</a:t>
-            </a:r>
-            <a:r>
-              <a:rPr lang="zh-CN" altLang="en-US" dirty="0"/>
-              <a:t>：直接调用</a:t>
-            </a:r>
-            <a:r>
-              <a:rPr lang="en-US" altLang="zh-CN" dirty="0" err="1"/>
-              <a:t>SYS_clean_module</a:t>
-            </a:r>
-            <a:r>
-              <a:rPr lang="zh-CN" altLang="en-US" dirty="0"/>
-              <a:t> ，参数为文件名</a:t>
-            </a:r>
-            <a:endParaRPr lang="en-US" altLang="zh-CN" dirty="0"/>
+              <a:rPr kumimoji="1" lang="zh-CN" altLang="en-US" dirty="0" smtClean="0"/>
+              <a:t>将符号加入内核的哈希符号表</a:t>
+            </a:r>
+          </a:p>
+          <a:p>
+            <a:pPr lvl="1"/>
+            <a:r>
+              <a:rPr kumimoji="1" lang="zh-CN" altLang="en-US" dirty="0" smtClean="0"/>
+              <a:t>如果符号类型是 </a:t>
+            </a:r>
+            <a:r>
+              <a:rPr kumimoji="1" lang="en-US" altLang="zh-CN" dirty="0" smtClean="0"/>
+              <a:t>SH_COMMON</a:t>
+            </a:r>
+            <a:r>
+              <a:rPr kumimoji="1" lang="zh-CN" altLang="en-US" dirty="0" smtClean="0"/>
+              <a:t>，需要为符号分配空间</a:t>
+            </a:r>
+          </a:p>
+          <a:p>
+            <a:r>
+              <a:rPr kumimoji="1" lang="en-US" altLang="zh-CN" dirty="0" smtClean="0"/>
+              <a:t>SH_NOBITS</a:t>
+            </a:r>
+            <a:r>
+              <a:rPr kumimoji="1" lang="zh-CN" altLang="en-US" dirty="0" smtClean="0"/>
+              <a:t> 段说明这个段在 </a:t>
+            </a:r>
+            <a:r>
+              <a:rPr kumimoji="1" lang="en-US" altLang="zh-CN" dirty="0" smtClean="0"/>
+              <a:t>elf</a:t>
+            </a:r>
+            <a:r>
+              <a:rPr kumimoji="1" lang="zh-CN" altLang="en-US" dirty="0" smtClean="0"/>
+              <a:t> 中定义了长度但是没有分配空间，需要自己分配</a:t>
+            </a:r>
+          </a:p>
+          <a:p>
+            <a:r>
+              <a:rPr kumimoji="1" lang="zh-CN" altLang="en-US" dirty="0" smtClean="0"/>
+              <a:t>重定位（重点）</a:t>
+            </a:r>
+          </a:p>
+          <a:p>
+            <a:endParaRPr kumimoji="1" lang="zh-CN" altLang="en-US" dirty="0" smtClean="0"/>
+          </a:p>
+          <a:p>
+            <a:endParaRPr kumimoji="1" lang="zh-CN" altLang="en-US" dirty="0" smtClean="0"/>
           </a:p>
         </p:txBody>
       </p:sp>
     </p:spTree>
     <p:extLst>
       <p:ext uri="{BB962C8B-B14F-4D97-AF65-F5344CB8AC3E}">
-        <p14:creationId xmlns:p14="http://schemas.microsoft.com/office/powerpoint/2010/main" val="773762884"/>
+        <p14:creationId xmlns:p14="http://schemas.microsoft.com/office/powerpoint/2010/main" val="2076348394"/>
+      </p:ext>
+    </p:extLst>
+  </p:cSld>
+  <p:clrMapOvr>
+    <a:masterClrMapping/>
+  </p:clrMapOvr>
+  <p:transition spd="med"/>
+</p:sld>
+</file>
+
+<file path=ppt/slides/slide8.xml><?xml version="1.0" encoding="utf-8"?>
+<p:sld xmlns:a="http://schemas.openxmlformats.org/drawingml/2006/main" xmlns:r="http://schemas.openxmlformats.org/officeDocument/2006/relationships" xmlns:p="http://schemas.openxmlformats.org/presentationml/2006/main">
+  <p:cSld>
+    <p:spTree>
+      <p:nvGrpSpPr>
+        <p:cNvPr id="1" name=""/>
+        <p:cNvGrpSpPr/>
+        <p:nvPr/>
+      </p:nvGrpSpPr>
+      <p:grpSpPr>
+        <a:xfrm>
+          <a:off x="0" y="0"/>
+          <a:ext cx="0" cy="0"/>
+          <a:chOff x="0" y="0"/>
+          <a:chExt cx="0" cy="0"/>
+        </a:xfrm>
+      </p:grpSpPr>
+      <p:sp>
+        <p:nvSpPr>
+          <p:cNvPr id="2" name="标题 1"/>
+          <p:cNvSpPr>
+            <a:spLocks noGrp="1"/>
+          </p:cNvSpPr>
+          <p:nvPr>
+            <p:ph type="title"/>
+          </p:nvPr>
+        </p:nvSpPr>
+        <p:spPr/>
+        <p:txBody>
+          <a:bodyPr/>
+          <a:lstStyle/>
+          <a:p>
+            <a:r>
+              <a:rPr kumimoji="1" lang="zh-CN" altLang="en-US" dirty="0" smtClean="0"/>
+              <a:t>重定位</a:t>
+            </a:r>
+            <a:endParaRPr kumimoji="1" lang="zh-CN" altLang="en-US" dirty="0"/>
+          </a:p>
+        </p:txBody>
+      </p:sp>
+      <p:sp>
+        <p:nvSpPr>
+          <p:cNvPr id="3" name="文本占位符 2"/>
+          <p:cNvSpPr>
+            <a:spLocks noGrp="1"/>
+          </p:cNvSpPr>
+          <p:nvPr>
+            <p:ph type="body" idx="1"/>
+          </p:nvPr>
+        </p:nvSpPr>
+        <p:spPr/>
+        <p:txBody>
+          <a:bodyPr>
+            <a:normAutofit fontScale="92500" lnSpcReduction="10000"/>
+          </a:bodyPr>
+          <a:lstStyle/>
+          <a:p>
+            <a:r>
+              <a:rPr kumimoji="1" lang="zh-CN" altLang="en-US" dirty="0" smtClean="0"/>
+              <a:t>对于普通符号，使用</a:t>
+            </a:r>
+            <a:r>
+              <a:rPr lang="zh-CN" altLang="en-US" dirty="0" smtClean="0"/>
+              <a:t>常规</a:t>
+            </a:r>
+            <a:r>
+              <a:rPr lang="zh-CN" altLang="en-US" dirty="0"/>
+              <a:t>处理方法，新地址为 </a:t>
+            </a:r>
+            <a:r>
+              <a:rPr lang="en-US" altLang="zh-CN" dirty="0"/>
+              <a:t>ELF </a:t>
+            </a:r>
+            <a:r>
+              <a:rPr lang="zh-CN" altLang="en-US" dirty="0"/>
+              <a:t>起始地址 </a:t>
+            </a:r>
+            <a:r>
+              <a:rPr lang="en-US" altLang="zh-CN" dirty="0"/>
+              <a:t>+ </a:t>
+            </a:r>
+            <a:r>
+              <a:rPr lang="zh-CN" altLang="en-US" dirty="0"/>
+              <a:t>符号段偏移 </a:t>
+            </a:r>
+            <a:r>
+              <a:rPr lang="en-US" altLang="zh-CN" dirty="0"/>
+              <a:t>+ </a:t>
+            </a:r>
+            <a:r>
+              <a:rPr lang="zh-CN" altLang="en-US" dirty="0"/>
+              <a:t>符号表项中</a:t>
+            </a:r>
+            <a:r>
+              <a:rPr lang="zh-CN" altLang="en-US" dirty="0" smtClean="0"/>
+              <a:t>的地址</a:t>
+            </a:r>
+          </a:p>
+          <a:p>
+            <a:r>
+              <a:rPr lang="zh-CN" altLang="en-US" dirty="0" smtClean="0"/>
+              <a:t>对于内核符号，由于内核模块链接时还没有这些符号，因此类型是 </a:t>
+            </a:r>
+            <a:r>
+              <a:rPr lang="en-US" altLang="zh-CN" dirty="0" smtClean="0"/>
+              <a:t>SHN_UNDEF</a:t>
+            </a:r>
+            <a:r>
+              <a:rPr lang="zh-CN" altLang="en-US" dirty="0" smtClean="0"/>
+              <a:t>。此时我们从 </a:t>
+            </a:r>
+            <a:r>
+              <a:rPr lang="en-US" altLang="zh-CN" dirty="0" err="1" smtClean="0"/>
+              <a:t>init</a:t>
+            </a:r>
+            <a:r>
+              <a:rPr lang="zh-CN" altLang="en-US" dirty="0" smtClean="0"/>
+              <a:t> 时导出的符号表中查找相应地址并填充</a:t>
+            </a:r>
+          </a:p>
+          <a:p>
+            <a:r>
+              <a:rPr lang="zh-CN" altLang="en-US" dirty="0" smtClean="0"/>
+              <a:t>在实现中我们发现有一类特殊的重定位类型 </a:t>
+            </a:r>
+            <a:r>
+              <a:rPr lang="en-US" altLang="zh-CN" dirty="0" smtClean="0"/>
+              <a:t>R_X86_64_32S</a:t>
+            </a:r>
+            <a:r>
+              <a:rPr lang="zh-CN" altLang="en-US" dirty="0" smtClean="0"/>
+              <a:t>，会将</a:t>
+            </a:r>
+            <a:r>
+              <a:rPr lang="en-US" altLang="zh-CN" dirty="0" smtClean="0"/>
+              <a:t>64</a:t>
+            </a:r>
+            <a:r>
+              <a:rPr lang="zh-CN" altLang="en-US" dirty="0" smtClean="0"/>
+              <a:t>位绝对地址截断，并在寻址时符号扩展。然而在我们的内核中这样扩展出的结果是错误的。因此我们通过探索，在编译内核模块的时候指定 </a:t>
+            </a:r>
+            <a:r>
+              <a:rPr lang="en-US" altLang="zh-CN" dirty="0" smtClean="0"/>
+              <a:t>pic</a:t>
+            </a:r>
+            <a:r>
+              <a:rPr lang="zh-CN" altLang="en-US" dirty="0" smtClean="0"/>
+              <a:t> 位置无关，避开了绝对地址的问题。</a:t>
+            </a:r>
+          </a:p>
+          <a:p>
+            <a:r>
+              <a:rPr lang="zh-CN" altLang="en-US" dirty="0" smtClean="0"/>
+              <a:t>在使用 </a:t>
+            </a:r>
+            <a:r>
+              <a:rPr lang="en-US" altLang="zh-CN" dirty="0" smtClean="0"/>
+              <a:t>pic</a:t>
+            </a:r>
+            <a:r>
+              <a:rPr lang="zh-CN" altLang="en-US" dirty="0" smtClean="0"/>
+              <a:t> 编译后的内核模块时，我们发现了一类之前工作没有处理过的类型 </a:t>
+            </a:r>
+            <a:r>
+              <a:rPr lang="en-US" altLang="zh-CN" dirty="0" smtClean="0"/>
+              <a:t>R_X86_64_PLT32</a:t>
+            </a:r>
+            <a:r>
+              <a:rPr lang="zh-CN" altLang="en-US" dirty="0" smtClean="0"/>
+              <a:t>，经过研究将这个段也填充起来，完成了重定位的工作。</a:t>
+            </a:r>
+            <a:endParaRPr lang="zh-CN" altLang="en-US" dirty="0"/>
+          </a:p>
+          <a:p>
+            <a:endParaRPr kumimoji="1" lang="zh-CN" altLang="en-US" dirty="0"/>
+          </a:p>
+        </p:txBody>
+      </p:sp>
+    </p:spTree>
+    <p:extLst>
+      <p:ext uri="{BB962C8B-B14F-4D97-AF65-F5344CB8AC3E}">
+        <p14:creationId xmlns:p14="http://schemas.microsoft.com/office/powerpoint/2010/main" val="1097341755"/>
+      </p:ext>
+    </p:extLst>
+  </p:cSld>
+  <p:clrMapOvr>
+    <a:masterClrMapping/>
+  </p:clrMapOvr>
+  <p:transition spd="med"/>
+</p:sld>
+</file>
+
+<file path=ppt/slides/slide9.xml><?xml version="1.0" encoding="utf-8"?>
+<p:sld xmlns:a="http://schemas.openxmlformats.org/drawingml/2006/main" xmlns:r="http://schemas.openxmlformats.org/officeDocument/2006/relationships" xmlns:p="http://schemas.openxmlformats.org/presentationml/2006/main">
+  <p:cSld>
+    <p:spTree>
+      <p:nvGrpSpPr>
+        <p:cNvPr id="1" name=""/>
+        <p:cNvGrpSpPr/>
+        <p:nvPr/>
+      </p:nvGrpSpPr>
+      <p:grpSpPr>
+        <a:xfrm>
+          <a:off x="0" y="0"/>
+          <a:ext cx="0" cy="0"/>
+          <a:chOff x="0" y="0"/>
+          <a:chExt cx="0" cy="0"/>
+        </a:xfrm>
+      </p:grpSpPr>
+      <p:sp>
+        <p:nvSpPr>
+          <p:cNvPr id="2" name="标题 1">
+            <a:extLst>
+              <a:ext uri="{FF2B5EF4-FFF2-40B4-BE49-F238E27FC236}">
+                <a16:creationId xmlns:a16="http://schemas.microsoft.com/office/drawing/2014/main" xmlns="" id="{599EABFF-600C-4EED-BD9C-4D58B2E00228}"/>
+              </a:ext>
+            </a:extLst>
+          </p:cNvPr>
+          <p:cNvSpPr>
+            <a:spLocks noGrp="1"/>
+          </p:cNvSpPr>
+          <p:nvPr>
+            <p:ph type="title"/>
+          </p:nvPr>
+        </p:nvSpPr>
+        <p:spPr/>
+        <p:txBody>
+          <a:bodyPr/>
+          <a:lstStyle/>
+          <a:p>
+            <a:r>
+              <a:rPr lang="en-US" altLang="zh-CN" dirty="0" err="1"/>
+              <a:t>SYS_cleanup_module</a:t>
+            </a:r>
+            <a:endParaRPr lang="zh-CN" altLang="en-US" dirty="0"/>
+          </a:p>
+        </p:txBody>
+      </p:sp>
+      <p:sp>
+        <p:nvSpPr>
+          <p:cNvPr id="3" name="文本占位符 2">
+            <a:extLst>
+              <a:ext uri="{FF2B5EF4-FFF2-40B4-BE49-F238E27FC236}">
+                <a16:creationId xmlns:a16="http://schemas.microsoft.com/office/drawing/2014/main" xmlns="" id="{6822B7F5-650E-404F-88B2-6B1C4AD1EDEA}"/>
+              </a:ext>
+            </a:extLst>
+          </p:cNvPr>
+          <p:cNvSpPr>
+            <a:spLocks noGrp="1"/>
+          </p:cNvSpPr>
+          <p:nvPr>
+            <p:ph type="body" idx="1"/>
+          </p:nvPr>
+        </p:nvSpPr>
+        <p:spPr/>
+        <p:txBody>
+          <a:bodyPr/>
+          <a:lstStyle/>
+          <a:p>
+            <a:r>
+              <a:rPr lang="zh-CN" altLang="en-US" dirty="0"/>
+              <a:t>将根据</a:t>
+            </a:r>
+            <a:r>
+              <a:rPr lang="en-US" altLang="zh-CN" dirty="0"/>
+              <a:t>module</a:t>
+            </a:r>
+            <a:r>
+              <a:rPr lang="zh-CN" altLang="en-US" dirty="0"/>
+              <a:t>名字将其移出符号表</a:t>
+            </a:r>
+          </a:p>
+          <a:p>
+            <a:endParaRPr lang="zh-CN" altLang="en-US" dirty="0"/>
+          </a:p>
+        </p:txBody>
+      </p:sp>
+    </p:spTree>
+    <p:extLst>
+      <p:ext uri="{BB962C8B-B14F-4D97-AF65-F5344CB8AC3E}">
+        <p14:creationId xmlns:p14="http://schemas.microsoft.com/office/powerpoint/2010/main" val="603591776"/>
       </p:ext>
     </p:extLst>
   </p:cSld>

</xml_diff>